<commit_message>
improved layout of the presentation
</commit_message>
<xml_diff>
--- a/Crop-Aware Panoptic Segmentation.pptx
+++ b/Crop-Aware Panoptic Segmentation.pptx
@@ -5,10 +5,10 @@
     <p:sldMasterId id="2147483653" r:id="rId1"/>
   </p:sldMasterIdLst>
   <p:notesMasterIdLst>
-    <p:notesMasterId r:id="rId11"/>
+    <p:notesMasterId r:id="rId14"/>
   </p:notesMasterIdLst>
   <p:handoutMasterIdLst>
-    <p:handoutMasterId r:id="rId12"/>
+    <p:handoutMasterId r:id="rId15"/>
   </p:handoutMasterIdLst>
   <p:sldIdLst>
     <p:sldId id="607" r:id="rId2"/>
@@ -16,15 +16,18 @@
     <p:sldId id="611" r:id="rId4"/>
     <p:sldId id="610" r:id="rId5"/>
     <p:sldId id="612" r:id="rId6"/>
-    <p:sldId id="613" r:id="rId7"/>
-    <p:sldId id="614" r:id="rId8"/>
-    <p:sldId id="615" r:id="rId9"/>
-    <p:sldId id="604" r:id="rId10"/>
+    <p:sldId id="616" r:id="rId7"/>
+    <p:sldId id="613" r:id="rId8"/>
+    <p:sldId id="614" r:id="rId9"/>
+    <p:sldId id="617" r:id="rId10"/>
+    <p:sldId id="615" r:id="rId11"/>
+    <p:sldId id="618" r:id="rId12"/>
+    <p:sldId id="604" r:id="rId13"/>
   </p:sldIdLst>
   <p:sldSz cx="9144000" cy="5143500" type="screen16x9"/>
   <p:notesSz cx="10234613" cy="7099300"/>
   <p:custDataLst>
-    <p:tags r:id="rId13"/>
+    <p:tags r:id="rId16"/>
   </p:custDataLst>
   <p:defaultTextStyle>
     <a:defPPr>
@@ -187,7 +190,7 @@
 <file path=ppt/revisionInfo.xml><?xml version="1.0" encoding="utf-8"?>
 <p1510:revInfo xmlns:a="http://schemas.openxmlformats.org/drawingml/2006/main" xmlns:r="http://schemas.openxmlformats.org/officeDocument/2006/relationships" xmlns:p1510="http://schemas.microsoft.com/office/powerpoint/2015/10/main">
   <p1510:revLst>
-    <p1510:client id="{2CD5F5D6-88A3-4631-A66A-40A03704DD16}" v="1" dt="2021-07-23T08:06:29.751"/>
+    <p1510:client id="{E8785D74-9879-42C5-9058-5D91577AAC50}" v="9" dt="2021-07-24T13:18:55.489"/>
   </p1510:revLst>
 </p1510:revInfo>
 </file>
@@ -381,6 +384,263 @@
       </pc:sldMasterChg>
     </pc:docChg>
   </pc:docChgLst>
+  <pc:docChgLst>
+    <pc:chgData name="Dystron Forever" userId="860741af1eec8ecc" providerId="LiveId" clId="{E8785D74-9879-42C5-9058-5D91577AAC50}"/>
+    <pc:docChg chg="custSel addSld delSld modSld">
+      <pc:chgData name="Dystron Forever" userId="860741af1eec8ecc" providerId="LiveId" clId="{E8785D74-9879-42C5-9058-5D91577AAC50}" dt="2021-07-24T13:39:06.374" v="933" actId="20577"/>
+      <pc:docMkLst>
+        <pc:docMk/>
+      </pc:docMkLst>
+      <pc:sldChg chg="delSp modSp mod">
+        <pc:chgData name="Dystron Forever" userId="860741af1eec8ecc" providerId="LiveId" clId="{E8785D74-9879-42C5-9058-5D91577AAC50}" dt="2021-07-24T13:22:28.236" v="521" actId="26606"/>
+        <pc:sldMkLst>
+          <pc:docMk/>
+          <pc:sldMk cId="463365429" sldId="612"/>
+        </pc:sldMkLst>
+        <pc:spChg chg="mod">
+          <ac:chgData name="Dystron Forever" userId="860741af1eec8ecc" providerId="LiveId" clId="{E8785D74-9879-42C5-9058-5D91577AAC50}" dt="2021-07-24T13:22:28.236" v="521" actId="26606"/>
+          <ac:spMkLst>
+            <pc:docMk/>
+            <pc:sldMk cId="463365429" sldId="612"/>
+            <ac:spMk id="3" creationId="{43404B09-8B2E-41C7-ACDC-FEC028CD3BA8}"/>
+          </ac:spMkLst>
+        </pc:spChg>
+        <pc:spChg chg="del">
+          <ac:chgData name="Dystron Forever" userId="860741af1eec8ecc" providerId="LiveId" clId="{E8785D74-9879-42C5-9058-5D91577AAC50}" dt="2021-07-24T13:22:28.236" v="521" actId="26606"/>
+          <ac:spMkLst>
+            <pc:docMk/>
+            <pc:sldMk cId="463365429" sldId="612"/>
+            <ac:spMk id="4" creationId="{A8E97774-92E3-4E04-9D90-A32D0CB6D1B1}"/>
+          </ac:spMkLst>
+        </pc:spChg>
+        <pc:picChg chg="mod">
+          <ac:chgData name="Dystron Forever" userId="860741af1eec8ecc" providerId="LiveId" clId="{E8785D74-9879-42C5-9058-5D91577AAC50}" dt="2021-07-24T13:22:28.236" v="521" actId="26606"/>
+          <ac:picMkLst>
+            <pc:docMk/>
+            <pc:sldMk cId="463365429" sldId="612"/>
+            <ac:picMk id="5" creationId="{46FA50DC-05C6-4C28-837C-9B3C178EACF3}"/>
+          </ac:picMkLst>
+        </pc:picChg>
+      </pc:sldChg>
+      <pc:sldChg chg="addSp delSp modSp mod modNotesTx">
+        <pc:chgData name="Dystron Forever" userId="860741af1eec8ecc" providerId="LiveId" clId="{E8785D74-9879-42C5-9058-5D91577AAC50}" dt="2021-07-24T13:22:13.302" v="520" actId="20577"/>
+        <pc:sldMkLst>
+          <pc:docMk/>
+          <pc:sldMk cId="1885977225" sldId="613"/>
+        </pc:sldMkLst>
+        <pc:spChg chg="mod">
+          <ac:chgData name="Dystron Forever" userId="860741af1eec8ecc" providerId="LiveId" clId="{E8785D74-9879-42C5-9058-5D91577AAC50}" dt="2021-07-24T13:13:55.895" v="212" actId="20577"/>
+          <ac:spMkLst>
+            <pc:docMk/>
+            <pc:sldMk cId="1885977225" sldId="613"/>
+            <ac:spMk id="4" creationId="{30C9BDA0-8F15-4D90-81BA-5E4C7E87598F}"/>
+          </ac:spMkLst>
+        </pc:spChg>
+        <pc:spChg chg="mod">
+          <ac:chgData name="Dystron Forever" userId="860741af1eec8ecc" providerId="LiveId" clId="{E8785D74-9879-42C5-9058-5D91577AAC50}" dt="2021-07-24T13:22:13.302" v="520" actId="20577"/>
+          <ac:spMkLst>
+            <pc:docMk/>
+            <pc:sldMk cId="1885977225" sldId="613"/>
+            <ac:spMk id="5" creationId="{879BE057-F79C-416A-BC4B-8048CEFEFBAF}"/>
+          </ac:spMkLst>
+        </pc:spChg>
+        <pc:spChg chg="add del mod">
+          <ac:chgData name="Dystron Forever" userId="860741af1eec8ecc" providerId="LiveId" clId="{E8785D74-9879-42C5-9058-5D91577AAC50}" dt="2021-07-24T13:11:38.782" v="135" actId="21"/>
+          <ac:spMkLst>
+            <pc:docMk/>
+            <pc:sldMk cId="1885977225" sldId="613"/>
+            <ac:spMk id="8" creationId="{04812295-E098-4483-B1F0-8E11D23620D7}"/>
+          </ac:spMkLst>
+        </pc:spChg>
+        <pc:spChg chg="add del mod">
+          <ac:chgData name="Dystron Forever" userId="860741af1eec8ecc" providerId="LiveId" clId="{E8785D74-9879-42C5-9058-5D91577AAC50}" dt="2021-07-24T13:11:38.782" v="135" actId="21"/>
+          <ac:spMkLst>
+            <pc:docMk/>
+            <pc:sldMk cId="1885977225" sldId="613"/>
+            <ac:spMk id="9" creationId="{464D937D-4440-4A79-B3F3-1B20FA4A0C77}"/>
+          </ac:spMkLst>
+        </pc:spChg>
+        <pc:picChg chg="add del mod">
+          <ac:chgData name="Dystron Forever" userId="860741af1eec8ecc" providerId="LiveId" clId="{E8785D74-9879-42C5-9058-5D91577AAC50}" dt="2021-07-24T13:11:38.782" v="135" actId="21"/>
+          <ac:picMkLst>
+            <pc:docMk/>
+            <pc:sldMk cId="1885977225" sldId="613"/>
+            <ac:picMk id="3" creationId="{B1334620-39D6-4DB6-90D2-E840EB8467E6}"/>
+          </ac:picMkLst>
+        </pc:picChg>
+        <pc:picChg chg="add del mod">
+          <ac:chgData name="Dystron Forever" userId="860741af1eec8ecc" providerId="LiveId" clId="{E8785D74-9879-42C5-9058-5D91577AAC50}" dt="2021-07-24T13:09:31.040" v="53" actId="478"/>
+          <ac:picMkLst>
+            <pc:docMk/>
+            <pc:sldMk cId="1885977225" sldId="613"/>
+            <ac:picMk id="7" creationId="{F6086B37-BDDB-4B7E-9789-8293393EB647}"/>
+          </ac:picMkLst>
+        </pc:picChg>
+        <pc:picChg chg="add del mod">
+          <ac:chgData name="Dystron Forever" userId="860741af1eec8ecc" providerId="LiveId" clId="{E8785D74-9879-42C5-9058-5D91577AAC50}" dt="2021-07-24T13:11:38.782" v="135" actId="21"/>
+          <ac:picMkLst>
+            <pc:docMk/>
+            <pc:sldMk cId="1885977225" sldId="613"/>
+            <ac:picMk id="11" creationId="{4AD75C56-6828-420E-9E18-6E48D749CAE4}"/>
+          </ac:picMkLst>
+        </pc:picChg>
+        <pc:picChg chg="add mod">
+          <ac:chgData name="Dystron Forever" userId="860741af1eec8ecc" providerId="LiveId" clId="{E8785D74-9879-42C5-9058-5D91577AAC50}" dt="2021-07-24T13:17:57.596" v="217" actId="1076"/>
+          <ac:picMkLst>
+            <pc:docMk/>
+            <pc:sldMk cId="1885977225" sldId="613"/>
+            <ac:picMk id="13" creationId="{FF7A492A-FA54-4B67-8A3B-536D293479E5}"/>
+          </ac:picMkLst>
+        </pc:picChg>
+      </pc:sldChg>
+      <pc:sldChg chg="addSp modSp mod modNotesTx">
+        <pc:chgData name="Dystron Forever" userId="860741af1eec8ecc" providerId="LiveId" clId="{E8785D74-9879-42C5-9058-5D91577AAC50}" dt="2021-07-24T13:22:45.134" v="523"/>
+        <pc:sldMkLst>
+          <pc:docMk/>
+          <pc:sldMk cId="2489557210" sldId="614"/>
+        </pc:sldMkLst>
+        <pc:spChg chg="mod">
+          <ac:chgData name="Dystron Forever" userId="860741af1eec8ecc" providerId="LiveId" clId="{E8785D74-9879-42C5-9058-5D91577AAC50}" dt="2021-07-24T13:22:42.966" v="522" actId="21"/>
+          <ac:spMkLst>
+            <pc:docMk/>
+            <pc:sldMk cId="2489557210" sldId="614"/>
+            <ac:spMk id="3" creationId="{E792780D-FF8B-464B-A133-01C1B809D660}"/>
+          </ac:spMkLst>
+        </pc:spChg>
+        <pc:spChg chg="add mod">
+          <ac:chgData name="Dystron Forever" userId="860741af1eec8ecc" providerId="LiveId" clId="{E8785D74-9879-42C5-9058-5D91577AAC50}" dt="2021-07-24T13:12:28.968" v="141" actId="1076"/>
+          <ac:spMkLst>
+            <pc:docMk/>
+            <pc:sldMk cId="2489557210" sldId="614"/>
+            <ac:spMk id="5" creationId="{BA942420-B2DF-4312-9F77-010105064C64}"/>
+          </ac:spMkLst>
+        </pc:spChg>
+        <pc:spChg chg="add mod">
+          <ac:chgData name="Dystron Forever" userId="860741af1eec8ecc" providerId="LiveId" clId="{E8785D74-9879-42C5-9058-5D91577AAC50}" dt="2021-07-24T13:12:28.968" v="141" actId="1076"/>
+          <ac:spMkLst>
+            <pc:docMk/>
+            <pc:sldMk cId="2489557210" sldId="614"/>
+            <ac:spMk id="6" creationId="{5B6482A4-EF81-4EB4-B206-D70873A4FFB9}"/>
+          </ac:spMkLst>
+        </pc:spChg>
+        <pc:picChg chg="add mod">
+          <ac:chgData name="Dystron Forever" userId="860741af1eec8ecc" providerId="LiveId" clId="{E8785D74-9879-42C5-9058-5D91577AAC50}" dt="2021-07-24T13:12:28.968" v="141" actId="1076"/>
+          <ac:picMkLst>
+            <pc:docMk/>
+            <pc:sldMk cId="2489557210" sldId="614"/>
+            <ac:picMk id="4" creationId="{019DB30C-1759-4DF1-AE4C-E17C76EE6AB0}"/>
+          </ac:picMkLst>
+        </pc:picChg>
+        <pc:picChg chg="add mod">
+          <ac:chgData name="Dystron Forever" userId="860741af1eec8ecc" providerId="LiveId" clId="{E8785D74-9879-42C5-9058-5D91577AAC50}" dt="2021-07-24T13:12:28.968" v="141" actId="1076"/>
+          <ac:picMkLst>
+            <pc:docMk/>
+            <pc:sldMk cId="2489557210" sldId="614"/>
+            <ac:picMk id="7" creationId="{B359E9AD-B13F-4042-BD52-83B942F326F2}"/>
+          </ac:picMkLst>
+        </pc:picChg>
+      </pc:sldChg>
+      <pc:sldChg chg="modSp mod">
+        <pc:chgData name="Dystron Forever" userId="860741af1eec8ecc" providerId="LiveId" clId="{E8785D74-9879-42C5-9058-5D91577AAC50}" dt="2021-07-24T13:39:06.374" v="933" actId="20577"/>
+        <pc:sldMkLst>
+          <pc:docMk/>
+          <pc:sldMk cId="803320101" sldId="615"/>
+        </pc:sldMkLst>
+        <pc:spChg chg="mod">
+          <ac:chgData name="Dystron Forever" userId="860741af1eec8ecc" providerId="LiveId" clId="{E8785D74-9879-42C5-9058-5D91577AAC50}" dt="2021-07-24T13:39:06.374" v="933" actId="20577"/>
+          <ac:spMkLst>
+            <pc:docMk/>
+            <pc:sldMk cId="803320101" sldId="615"/>
+            <ac:spMk id="3" creationId="{CFB73C6E-E25A-4AD9-9620-74058DEEA275}"/>
+          </ac:spMkLst>
+        </pc:spChg>
+      </pc:sldChg>
+      <pc:sldChg chg="modSp new mod">
+        <pc:chgData name="Dystron Forever" userId="860741af1eec8ecc" providerId="LiveId" clId="{E8785D74-9879-42C5-9058-5D91577AAC50}" dt="2021-07-24T13:27:57.769" v="676" actId="20577"/>
+        <pc:sldMkLst>
+          <pc:docMk/>
+          <pc:sldMk cId="31551848" sldId="616"/>
+        </pc:sldMkLst>
+        <pc:spChg chg="mod">
+          <ac:chgData name="Dystron Forever" userId="860741af1eec8ecc" providerId="LiveId" clId="{E8785D74-9879-42C5-9058-5D91577AAC50}" dt="2021-07-24T13:26:24.583" v="552" actId="20577"/>
+          <ac:spMkLst>
+            <pc:docMk/>
+            <pc:sldMk cId="31551848" sldId="616"/>
+            <ac:spMk id="2" creationId="{AF311FAB-AD3C-4964-9198-8FCBF12C9111}"/>
+          </ac:spMkLst>
+        </pc:spChg>
+        <pc:spChg chg="mod">
+          <ac:chgData name="Dystron Forever" userId="860741af1eec8ecc" providerId="LiveId" clId="{E8785D74-9879-42C5-9058-5D91577AAC50}" dt="2021-07-24T13:27:57.769" v="676" actId="20577"/>
+          <ac:spMkLst>
+            <pc:docMk/>
+            <pc:sldMk cId="31551848" sldId="616"/>
+            <ac:spMk id="3" creationId="{19BCFA74-BA43-4AED-8291-33BE8E5C855C}"/>
+          </ac:spMkLst>
+        </pc:spChg>
+      </pc:sldChg>
+      <pc:sldChg chg="modSp new del mod">
+        <pc:chgData name="Dystron Forever" userId="860741af1eec8ecc" providerId="LiveId" clId="{E8785D74-9879-42C5-9058-5D91577AAC50}" dt="2021-07-24T13:27:31.952" v="603" actId="2696"/>
+        <pc:sldMkLst>
+          <pc:docMk/>
+          <pc:sldMk cId="2130268812" sldId="617"/>
+        </pc:sldMkLst>
+        <pc:spChg chg="mod">
+          <ac:chgData name="Dystron Forever" userId="860741af1eec8ecc" providerId="LiveId" clId="{E8785D74-9879-42C5-9058-5D91577AAC50}" dt="2021-07-24T13:27:24.435" v="602" actId="20577"/>
+          <ac:spMkLst>
+            <pc:docMk/>
+            <pc:sldMk cId="2130268812" sldId="617"/>
+            <ac:spMk id="2" creationId="{C2887700-5536-44B0-907C-FAD83586CA83}"/>
+          </ac:spMkLst>
+        </pc:spChg>
+      </pc:sldChg>
+      <pc:sldChg chg="modSp new mod">
+        <pc:chgData name="Dystron Forever" userId="860741af1eec8ecc" providerId="LiveId" clId="{E8785D74-9879-42C5-9058-5D91577AAC50}" dt="2021-07-24T13:37:21.150" v="762" actId="20577"/>
+        <pc:sldMkLst>
+          <pc:docMk/>
+          <pc:sldMk cId="2836184599" sldId="617"/>
+        </pc:sldMkLst>
+        <pc:spChg chg="mod">
+          <ac:chgData name="Dystron Forever" userId="860741af1eec8ecc" providerId="LiveId" clId="{E8785D74-9879-42C5-9058-5D91577AAC50}" dt="2021-07-24T13:36:21.655" v="695" actId="20577"/>
+          <ac:spMkLst>
+            <pc:docMk/>
+            <pc:sldMk cId="2836184599" sldId="617"/>
+            <ac:spMk id="2" creationId="{2DE899C9-ECB8-4209-B44A-D55809197041}"/>
+          </ac:spMkLst>
+        </pc:spChg>
+        <pc:spChg chg="mod">
+          <ac:chgData name="Dystron Forever" userId="860741af1eec8ecc" providerId="LiveId" clId="{E8785D74-9879-42C5-9058-5D91577AAC50}" dt="2021-07-24T13:37:21.150" v="762" actId="20577"/>
+          <ac:spMkLst>
+            <pc:docMk/>
+            <pc:sldMk cId="2836184599" sldId="617"/>
+            <ac:spMk id="3" creationId="{855BEFD4-C452-40AA-8020-77316D8CF61E}"/>
+          </ac:spMkLst>
+        </pc:spChg>
+      </pc:sldChg>
+      <pc:sldChg chg="modSp new mod">
+        <pc:chgData name="Dystron Forever" userId="860741af1eec8ecc" providerId="LiveId" clId="{E8785D74-9879-42C5-9058-5D91577AAC50}" dt="2021-07-24T13:38:49.652" v="905" actId="20577"/>
+        <pc:sldMkLst>
+          <pc:docMk/>
+          <pc:sldMk cId="2748774166" sldId="618"/>
+        </pc:sldMkLst>
+        <pc:spChg chg="mod">
+          <ac:chgData name="Dystron Forever" userId="860741af1eec8ecc" providerId="LiveId" clId="{E8785D74-9879-42C5-9058-5D91577AAC50}" dt="2021-07-24T13:38:23.101" v="820" actId="20577"/>
+          <ac:spMkLst>
+            <pc:docMk/>
+            <pc:sldMk cId="2748774166" sldId="618"/>
+            <ac:spMk id="2" creationId="{B04B6A19-647C-4D28-A0C4-DC3919B963B2}"/>
+          </ac:spMkLst>
+        </pc:spChg>
+        <pc:spChg chg="mod">
+          <ac:chgData name="Dystron Forever" userId="860741af1eec8ecc" providerId="LiveId" clId="{E8785D74-9879-42C5-9058-5D91577AAC50}" dt="2021-07-24T13:38:49.652" v="905" actId="20577"/>
+          <ac:spMkLst>
+            <pc:docMk/>
+            <pc:sldMk cId="2748774166" sldId="618"/>
+            <ac:spMk id="3" creationId="{A389FADC-3889-478E-AB32-B9F0461268D2}"/>
+          </ac:spMkLst>
+        </pc:spChg>
+      </pc:sldChg>
+    </pc:docChg>
+  </pc:docChgLst>
 </pc:chgInfo>
 </file>
 
@@ -466,7 +726,7 @@
           <a:p>
             <a:fld id="{4E9DBEC1-03D6-8C41-96E3-520E1D7FD629}" type="datetimeFigureOut">
               <a:rPr lang="en-US" smtClean="0"/>
-              <a:t>7/23/2021</a:t>
+              <a:t>7/24/2021</a:t>
             </a:fld>
             <a:endParaRPr lang="en-US"/>
           </a:p>
@@ -532,7 +792,7 @@
           <a:p>
             <a:fld id="{1FAA035C-FB08-0242-AF90-D9F53D6B6D73}" type="slidenum">
               <a:rPr lang="en-US" smtClean="0"/>
-              <a:t>‹#›</a:t>
+              <a:t>‹Nr.›</a:t>
             </a:fld>
             <a:endParaRPr lang="en-US"/>
           </a:p>
@@ -627,7 +887,7 @@
               </a14:hiddenEffects>
             </a:ext>
             <a:ext uri="{FAA26D3D-D897-4be2-8F04-BA451C77F1D7}">
-              <ma14:placeholderFlag xmlns:ma14="http://schemas.microsoft.com/office/mac/drawingml/2011/main" xmlns="" val="1"/>
+              <ma14:placeholderFlag xmlns="" xmlns:ma14="http://schemas.microsoft.com/office/mac/drawingml/2011/main" val="1"/>
             </a:ext>
           </a:extLst>
         </p:spPr>
@@ -706,7 +966,7 @@
               </a14:hiddenEffects>
             </a:ext>
             <a:ext uri="{FAA26D3D-D897-4be2-8F04-BA451C77F1D7}">
-              <ma14:placeholderFlag xmlns:ma14="http://schemas.microsoft.com/office/mac/drawingml/2011/main" xmlns="" val="1"/>
+              <ma14:placeholderFlag xmlns="" xmlns:ma14="http://schemas.microsoft.com/office/mac/drawingml/2011/main" val="1"/>
             </a:ext>
           </a:extLst>
         </p:spPr>
@@ -831,7 +1091,7 @@
               </a14:hiddenEffects>
             </a:ext>
             <a:ext uri="{FAA26D3D-D897-4be2-8F04-BA451C77F1D7}">
-              <ma14:placeholderFlag xmlns:ma14="http://schemas.microsoft.com/office/mac/drawingml/2011/main" xmlns="" val="1"/>
+              <ma14:placeholderFlag xmlns="" xmlns:ma14="http://schemas.microsoft.com/office/mac/drawingml/2011/main" val="1"/>
             </a:ext>
           </a:extLst>
         </p:spPr>
@@ -932,7 +1192,7 @@
               </a14:hiddenEffects>
             </a:ext>
             <a:ext uri="{FAA26D3D-D897-4be2-8F04-BA451C77F1D7}">
-              <ma14:placeholderFlag xmlns:ma14="http://schemas.microsoft.com/office/mac/drawingml/2011/main" xmlns="" val="1"/>
+              <ma14:placeholderFlag xmlns="" xmlns:ma14="http://schemas.microsoft.com/office/mac/drawingml/2011/main" val="1"/>
             </a:ext>
           </a:extLst>
         </p:spPr>
@@ -1011,7 +1271,7 @@
               </a14:hiddenEffects>
             </a:ext>
             <a:ext uri="{FAA26D3D-D897-4be2-8F04-BA451C77F1D7}">
-              <ma14:placeholderFlag xmlns:ma14="http://schemas.microsoft.com/office/mac/drawingml/2011/main" xmlns="" val="1"/>
+              <ma14:placeholderFlag xmlns="" xmlns:ma14="http://schemas.microsoft.com/office/mac/drawingml/2011/main" val="1"/>
             </a:ext>
           </a:extLst>
         </p:spPr>
@@ -1038,7 +1298,7 @@
               <a:pPr>
                 <a:defRPr/>
               </a:pPr>
-              <a:t>‹#›</a:t>
+              <a:t>‹Nr.›</a:t>
             </a:fld>
             <a:endParaRPr lang="en-US" dirty="0"/>
           </a:p>
@@ -1432,7 +1692,7 @@
       </p:grpSpPr>
       <p:sp>
         <p:nvSpPr>
-          <p:cNvPr id="2" name="Slide Image Placeholder 1"/>
+          <p:cNvPr id="2" name="Folienbildplatzhalter 1"/>
           <p:cNvSpPr>
             <a:spLocks noGrp="1" noRot="1" noChangeAspect="1"/>
           </p:cNvSpPr>
@@ -1440,16 +1700,11 @@
             <p:ph type="sldImg"/>
           </p:nvPr>
         </p:nvSpPr>
-        <p:spPr>
-          <a:xfrm>
-            <a:off x="2752725" y="533400"/>
-            <a:ext cx="4729163" cy="2660650"/>
-          </a:xfrm>
-        </p:spPr>
-      </p:sp>
-      <p:sp>
-        <p:nvSpPr>
-          <p:cNvPr id="3" name="Notes Placeholder 2"/>
+        <p:spPr/>
+      </p:sp>
+      <p:sp>
+        <p:nvSpPr>
+          <p:cNvPr id="3" name="Notizenplatzhalter 2"/>
           <p:cNvSpPr>
             <a:spLocks noGrp="1"/>
           </p:cNvSpPr>
@@ -1462,18 +1717,21 @@
           <a:bodyPr/>
           <a:lstStyle/>
           <a:p>
-            <a:endParaRPr lang="en-US" baseline="0" dirty="0"/>
+            <a:r>
+              <a:rPr lang="en-US" dirty="0"/>
+              <a:t>With CABB is an adapted version is a greater equal in SOLVE O1</a:t>
+            </a:r>
           </a:p>
         </p:txBody>
       </p:sp>
       <p:sp>
         <p:nvSpPr>
-          <p:cNvPr id="4" name="Slide Number Placeholder 3"/>
+          <p:cNvPr id="4" name="Foliennummernplatzhalter 3"/>
           <p:cNvSpPr>
             <a:spLocks noGrp="1"/>
           </p:cNvSpPr>
           <p:nvPr>
-            <p:ph type="sldNum" sz="quarter" idx="10"/>
+            <p:ph type="sldNum" sz="quarter" idx="5"/>
           </p:nvPr>
         </p:nvSpPr>
         <p:spPr/>
@@ -1489,7 +1747,217 @@
               <a:pPr>
                 <a:defRPr/>
               </a:pPr>
-              <a:t>9</a:t>
+              <a:t>7</a:t>
+            </a:fld>
+            <a:endParaRPr lang="en-US" dirty="0"/>
+          </a:p>
+        </p:txBody>
+      </p:sp>
+    </p:spTree>
+    <p:extLst>
+      <p:ext uri="{BB962C8B-B14F-4D97-AF65-F5344CB8AC3E}">
+        <p14:creationId xmlns:p14="http://schemas.microsoft.com/office/powerpoint/2010/main" val="4130055103"/>
+      </p:ext>
+    </p:extLst>
+  </p:cSld>
+  <p:clrMapOvr>
+    <a:masterClrMapping/>
+  </p:clrMapOvr>
+</p:notes>
+</file>
+
+<file path=ppt/notesSlides/notesSlide4.xml><?xml version="1.0" encoding="utf-8"?>
+<p:notes xmlns:a="http://schemas.openxmlformats.org/drawingml/2006/main" xmlns:r="http://schemas.openxmlformats.org/officeDocument/2006/relationships" xmlns:p="http://schemas.openxmlformats.org/presentationml/2006/main">
+  <p:cSld>
+    <p:spTree>
+      <p:nvGrpSpPr>
+        <p:cNvPr id="1" name=""/>
+        <p:cNvGrpSpPr/>
+        <p:nvPr/>
+      </p:nvGrpSpPr>
+      <p:grpSpPr>
+        <a:xfrm>
+          <a:off x="0" y="0"/>
+          <a:ext cx="0" cy="0"/>
+          <a:chOff x="0" y="0"/>
+          <a:chExt cx="0" cy="0"/>
+        </a:xfrm>
+      </p:grpSpPr>
+      <p:sp>
+        <p:nvSpPr>
+          <p:cNvPr id="2" name="Folienbildplatzhalter 1"/>
+          <p:cNvSpPr>
+            <a:spLocks noGrp="1" noRot="1" noChangeAspect="1"/>
+          </p:cNvSpPr>
+          <p:nvPr>
+            <p:ph type="sldImg"/>
+          </p:nvPr>
+        </p:nvSpPr>
+        <p:spPr/>
+      </p:sp>
+      <p:sp>
+        <p:nvSpPr>
+          <p:cNvPr id="3" name="Notizenplatzhalter 2"/>
+          <p:cNvSpPr>
+            <a:spLocks noGrp="1"/>
+          </p:cNvSpPr>
+          <p:nvPr>
+            <p:ph type="body" idx="1"/>
+          </p:nvPr>
+        </p:nvSpPr>
+        <p:spPr/>
+        <p:txBody>
+          <a:bodyPr/>
+          <a:lstStyle/>
+          <a:p>
+            <a:pPr marL="285750" marR="0" lvl="0" indent="-285750" algn="l" defTabSz="914400" rtl="0" eaLnBrk="0" fontAlgn="base" latinLnBrk="0" hangingPunct="0">
+              <a:lnSpc>
+                <a:spcPct val="100000"/>
+              </a:lnSpc>
+              <a:spcBef>
+                <a:spcPct val="30000"/>
+              </a:spcBef>
+              <a:spcAft>
+                <a:spcPct val="0"/>
+              </a:spcAft>
+              <a:buClr>
+                <a:srgbClr val="800000"/>
+              </a:buClr>
+              <a:buSzTx/>
+              <a:buFont typeface="Wingdings" charset="2"/>
+              <a:buChar char="§"/>
+              <a:tabLst/>
+              <a:defRPr/>
+            </a:pPr>
+            <a:r>
+              <a:rPr lang="en-GB" dirty="0"/>
+              <a:t>TODO add loss values here</a:t>
+            </a:r>
+          </a:p>
+          <a:p>
+            <a:endParaRPr lang="en-US" dirty="0"/>
+          </a:p>
+        </p:txBody>
+      </p:sp>
+      <p:sp>
+        <p:nvSpPr>
+          <p:cNvPr id="4" name="Foliennummernplatzhalter 3"/>
+          <p:cNvSpPr>
+            <a:spLocks noGrp="1"/>
+          </p:cNvSpPr>
+          <p:nvPr>
+            <p:ph type="sldNum" sz="quarter" idx="5"/>
+          </p:nvPr>
+        </p:nvSpPr>
+        <p:spPr/>
+        <p:txBody>
+          <a:bodyPr/>
+          <a:lstStyle/>
+          <a:p>
+            <a:pPr>
+              <a:defRPr/>
+            </a:pPr>
+            <a:fld id="{2D72F1E3-2578-1242-A6A3-72B7E9BB2E1A}" type="slidenum">
+              <a:rPr lang="en-US" smtClean="0"/>
+              <a:pPr>
+                <a:defRPr/>
+              </a:pPr>
+              <a:t>8</a:t>
+            </a:fld>
+            <a:endParaRPr lang="en-US" dirty="0"/>
+          </a:p>
+        </p:txBody>
+      </p:sp>
+    </p:spTree>
+    <p:extLst>
+      <p:ext uri="{BB962C8B-B14F-4D97-AF65-F5344CB8AC3E}">
+        <p14:creationId xmlns:p14="http://schemas.microsoft.com/office/powerpoint/2010/main" val="3648046172"/>
+      </p:ext>
+    </p:extLst>
+  </p:cSld>
+  <p:clrMapOvr>
+    <a:masterClrMapping/>
+  </p:clrMapOvr>
+</p:notes>
+</file>
+
+<file path=ppt/notesSlides/notesSlide5.xml><?xml version="1.0" encoding="utf-8"?>
+<p:notes xmlns:a="http://schemas.openxmlformats.org/drawingml/2006/main" xmlns:r="http://schemas.openxmlformats.org/officeDocument/2006/relationships" xmlns:p="http://schemas.openxmlformats.org/presentationml/2006/main">
+  <p:cSld>
+    <p:spTree>
+      <p:nvGrpSpPr>
+        <p:cNvPr id="1" name=""/>
+        <p:cNvGrpSpPr/>
+        <p:nvPr/>
+      </p:nvGrpSpPr>
+      <p:grpSpPr>
+        <a:xfrm>
+          <a:off x="0" y="0"/>
+          <a:ext cx="0" cy="0"/>
+          <a:chOff x="0" y="0"/>
+          <a:chExt cx="0" cy="0"/>
+        </a:xfrm>
+      </p:grpSpPr>
+      <p:sp>
+        <p:nvSpPr>
+          <p:cNvPr id="2" name="Slide Image Placeholder 1"/>
+          <p:cNvSpPr>
+            <a:spLocks noGrp="1" noRot="1" noChangeAspect="1"/>
+          </p:cNvSpPr>
+          <p:nvPr>
+            <p:ph type="sldImg"/>
+          </p:nvPr>
+        </p:nvSpPr>
+        <p:spPr>
+          <a:xfrm>
+            <a:off x="2752725" y="533400"/>
+            <a:ext cx="4729163" cy="2660650"/>
+          </a:xfrm>
+        </p:spPr>
+      </p:sp>
+      <p:sp>
+        <p:nvSpPr>
+          <p:cNvPr id="3" name="Notes Placeholder 2"/>
+          <p:cNvSpPr>
+            <a:spLocks noGrp="1"/>
+          </p:cNvSpPr>
+          <p:nvPr>
+            <p:ph type="body" idx="1"/>
+          </p:nvPr>
+        </p:nvSpPr>
+        <p:spPr/>
+        <p:txBody>
+          <a:bodyPr/>
+          <a:lstStyle/>
+          <a:p>
+            <a:endParaRPr lang="en-US" baseline="0" dirty="0"/>
+          </a:p>
+        </p:txBody>
+      </p:sp>
+      <p:sp>
+        <p:nvSpPr>
+          <p:cNvPr id="4" name="Slide Number Placeholder 3"/>
+          <p:cNvSpPr>
+            <a:spLocks noGrp="1"/>
+          </p:cNvSpPr>
+          <p:nvPr>
+            <p:ph type="sldNum" sz="quarter" idx="10"/>
+          </p:nvPr>
+        </p:nvSpPr>
+        <p:spPr/>
+        <p:txBody>
+          <a:bodyPr/>
+          <a:lstStyle/>
+          <a:p>
+            <a:pPr>
+              <a:defRPr/>
+            </a:pPr>
+            <a:fld id="{2D72F1E3-2578-1242-A6A3-72B7E9BB2E1A}" type="slidenum">
+              <a:rPr lang="en-US" smtClean="0"/>
+              <a:pPr>
+                <a:defRPr/>
+              </a:pPr>
+              <a:t>12</a:t>
             </a:fld>
             <a:endParaRPr lang="en-US" dirty="0"/>
           </a:p>
@@ -3045,7 +3513,7 @@
               </a14:hiddenEffects>
             </a:ext>
             <a:ext uri="{FAA26D3D-D897-4be2-8F04-BA451C77F1D7}">
-              <ma14:placeholderFlag xmlns:ma14="http://schemas.microsoft.com/office/mac/drawingml/2011/main" xmlns="" val="1"/>
+              <ma14:placeholderFlag xmlns="" xmlns:ma14="http://schemas.microsoft.com/office/mac/drawingml/2011/main" val="1"/>
             </a:ext>
           </a:extLst>
         </p:spPr>
@@ -3119,7 +3587,7 @@
               </a14:hiddenEffects>
             </a:ext>
             <a:ext uri="{FAA26D3D-D897-4be2-8F04-BA451C77F1D7}">
-              <ma14:placeholderFlag xmlns:ma14="http://schemas.microsoft.com/office/mac/drawingml/2011/main" xmlns="" val="1"/>
+              <ma14:placeholderFlag xmlns="" xmlns:ma14="http://schemas.microsoft.com/office/mac/drawingml/2011/main" val="1"/>
             </a:ext>
           </a:extLst>
         </p:spPr>
@@ -3687,6 +4155,292 @@
 </p:sld>
 </file>
 
+<file path=ppt/slides/slide10.xml><?xml version="1.0" encoding="utf-8"?>
+<p:sld xmlns:a="http://schemas.openxmlformats.org/drawingml/2006/main" xmlns:r="http://schemas.openxmlformats.org/officeDocument/2006/relationships" xmlns:p="http://schemas.openxmlformats.org/presentationml/2006/main">
+  <p:cSld>
+    <p:spTree>
+      <p:nvGrpSpPr>
+        <p:cNvPr id="1" name=""/>
+        <p:cNvGrpSpPr/>
+        <p:nvPr/>
+      </p:nvGrpSpPr>
+      <p:grpSpPr>
+        <a:xfrm>
+          <a:off x="0" y="0"/>
+          <a:ext cx="0" cy="0"/>
+          <a:chOff x="0" y="0"/>
+          <a:chExt cx="0" cy="0"/>
+        </a:xfrm>
+      </p:grpSpPr>
+      <p:sp>
+        <p:nvSpPr>
+          <p:cNvPr id="2" name="Title 1">
+            <a:extLst>
+              <a:ext uri="{FF2B5EF4-FFF2-40B4-BE49-F238E27FC236}">
+                <a16:creationId xmlns:a16="http://schemas.microsoft.com/office/drawing/2014/main" id="{2D09D21D-85D3-45EE-901C-55BD06588083}"/>
+              </a:ext>
+            </a:extLst>
+          </p:cNvPr>
+          <p:cNvSpPr>
+            <a:spLocks noGrp="1"/>
+          </p:cNvSpPr>
+          <p:nvPr>
+            <p:ph type="title"/>
+          </p:nvPr>
+        </p:nvSpPr>
+        <p:spPr/>
+        <p:txBody>
+          <a:bodyPr/>
+          <a:lstStyle/>
+          <a:p>
+            <a:r>
+              <a:rPr lang="en-US" dirty="0"/>
+              <a:t>Results/Comparison</a:t>
+            </a:r>
+          </a:p>
+        </p:txBody>
+      </p:sp>
+      <p:sp>
+        <p:nvSpPr>
+          <p:cNvPr id="3" name="Content Placeholder 2">
+            <a:extLst>
+              <a:ext uri="{FF2B5EF4-FFF2-40B4-BE49-F238E27FC236}">
+                <a16:creationId xmlns:a16="http://schemas.microsoft.com/office/drawing/2014/main" id="{CFB73C6E-E25A-4AD9-9620-74058DEEA275}"/>
+              </a:ext>
+            </a:extLst>
+          </p:cNvPr>
+          <p:cNvSpPr>
+            <a:spLocks noGrp="1"/>
+          </p:cNvSpPr>
+          <p:nvPr>
+            <p:ph idx="1"/>
+          </p:nvPr>
+        </p:nvSpPr>
+        <p:spPr/>
+        <p:txBody>
+          <a:bodyPr/>
+          <a:lstStyle/>
+          <a:p>
+            <a:r>
+              <a:rPr lang="en-US" dirty="0"/>
+              <a:t>Final values</a:t>
+            </a:r>
+          </a:p>
+          <a:p>
+            <a:r>
+              <a:rPr lang="en-US" dirty="0"/>
+              <a:t>Graph with history?</a:t>
+            </a:r>
+          </a:p>
+          <a:p>
+            <a:r>
+              <a:rPr lang="en-US" dirty="0"/>
+              <a:t>Training speed difference(look when episode saves were created)!</a:t>
+            </a:r>
+          </a:p>
+          <a:p>
+            <a:r>
+              <a:rPr lang="en-US" dirty="0"/>
+              <a:t>Difference in final images?</a:t>
+            </a:r>
+          </a:p>
+        </p:txBody>
+      </p:sp>
+    </p:spTree>
+    <p:extLst>
+      <p:ext uri="{BB962C8B-B14F-4D97-AF65-F5344CB8AC3E}">
+        <p14:creationId xmlns:p14="http://schemas.microsoft.com/office/powerpoint/2010/main" val="803320101"/>
+      </p:ext>
+    </p:extLst>
+  </p:cSld>
+  <p:clrMapOvr>
+    <a:masterClrMapping/>
+  </p:clrMapOvr>
+</p:sld>
+</file>
+
+<file path=ppt/slides/slide11.xml><?xml version="1.0" encoding="utf-8"?>
+<p:sld xmlns:a="http://schemas.openxmlformats.org/drawingml/2006/main" xmlns:r="http://schemas.openxmlformats.org/officeDocument/2006/relationships" xmlns:p="http://schemas.openxmlformats.org/presentationml/2006/main">
+  <p:cSld>
+    <p:spTree>
+      <p:nvGrpSpPr>
+        <p:cNvPr id="1" name=""/>
+        <p:cNvGrpSpPr/>
+        <p:nvPr/>
+      </p:nvGrpSpPr>
+      <p:grpSpPr>
+        <a:xfrm>
+          <a:off x="0" y="0"/>
+          <a:ext cx="0" cy="0"/>
+          <a:chOff x="0" y="0"/>
+          <a:chExt cx="0" cy="0"/>
+        </a:xfrm>
+      </p:grpSpPr>
+      <p:sp>
+        <p:nvSpPr>
+          <p:cNvPr id="2" name="Titel 1">
+            <a:extLst>
+              <a:ext uri="{FF2B5EF4-FFF2-40B4-BE49-F238E27FC236}">
+                <a16:creationId xmlns:a16="http://schemas.microsoft.com/office/drawing/2014/main" id="{B04B6A19-647C-4D28-A0C4-DC3919B963B2}"/>
+              </a:ext>
+            </a:extLst>
+          </p:cNvPr>
+          <p:cNvSpPr>
+            <a:spLocks noGrp="1"/>
+          </p:cNvSpPr>
+          <p:nvPr>
+            <p:ph type="title"/>
+          </p:nvPr>
+        </p:nvSpPr>
+        <p:spPr>
+          <a:xfrm>
+            <a:off x="381000" y="243543"/>
+            <a:ext cx="8545672" cy="954107"/>
+          </a:xfrm>
+        </p:spPr>
+        <p:txBody>
+          <a:bodyPr/>
+          <a:lstStyle/>
+          <a:p>
+            <a:r>
+              <a:rPr lang="en-US" dirty="0" err="1"/>
+              <a:t>Unaccaunted</a:t>
+            </a:r>
+            <a:r>
+              <a:rPr lang="en-US" dirty="0"/>
+              <a:t> Case of </a:t>
+            </a:r>
+            <a:r>
+              <a:rPr lang="en-US" dirty="0" err="1"/>
+              <a:t>omega_p</a:t>
+            </a:r>
+            <a:r>
+              <a:rPr lang="en-US" dirty="0"/>
+              <a:t> = </a:t>
+            </a:r>
+            <a:r>
+              <a:rPr lang="en-US" dirty="0" err="1"/>
+              <a:t>omega_hat</a:t>
+            </a:r>
+            <a:r>
+              <a:rPr lang="en-US" dirty="0"/>
+              <a:t>??</a:t>
+            </a:r>
+          </a:p>
+        </p:txBody>
+      </p:sp>
+      <p:sp>
+        <p:nvSpPr>
+          <p:cNvPr id="3" name="Inhaltsplatzhalter 2">
+            <a:extLst>
+              <a:ext uri="{FF2B5EF4-FFF2-40B4-BE49-F238E27FC236}">
+                <a16:creationId xmlns:a16="http://schemas.microsoft.com/office/drawing/2014/main" id="{A389FADC-3889-478E-AB32-B9F0461268D2}"/>
+              </a:ext>
+            </a:extLst>
+          </p:cNvPr>
+          <p:cNvSpPr>
+            <a:spLocks noGrp="1"/>
+          </p:cNvSpPr>
+          <p:nvPr>
+            <p:ph idx="1"/>
+          </p:nvPr>
+        </p:nvSpPr>
+        <p:spPr/>
+        <p:txBody>
+          <a:bodyPr/>
+          <a:lstStyle/>
+          <a:p>
+            <a:endParaRPr lang="en-US" dirty="0"/>
+          </a:p>
+          <a:p>
+            <a:endParaRPr lang="en-US" dirty="0"/>
+          </a:p>
+          <a:p>
+            <a:r>
+              <a:rPr lang="en-US" dirty="0"/>
+              <a:t>Would need to first </a:t>
+            </a:r>
+            <a:r>
+              <a:rPr lang="en-US" dirty="0" err="1"/>
+              <a:t>incroduce</a:t>
+            </a:r>
+            <a:r>
+              <a:rPr lang="en-US" dirty="0"/>
+              <a:t> the algorithms and then show how it can happen</a:t>
+            </a:r>
+          </a:p>
+        </p:txBody>
+      </p:sp>
+    </p:spTree>
+    <p:extLst>
+      <p:ext uri="{BB962C8B-B14F-4D97-AF65-F5344CB8AC3E}">
+        <p14:creationId xmlns:p14="http://schemas.microsoft.com/office/powerpoint/2010/main" val="2748774166"/>
+      </p:ext>
+    </p:extLst>
+  </p:cSld>
+  <p:clrMapOvr>
+    <a:masterClrMapping/>
+  </p:clrMapOvr>
+</p:sld>
+</file>
+
+<file path=ppt/slides/slide12.xml><?xml version="1.0" encoding="utf-8"?>
+<p:sld xmlns:a="http://schemas.openxmlformats.org/drawingml/2006/main" xmlns:r="http://schemas.openxmlformats.org/officeDocument/2006/relationships" xmlns:p="http://schemas.openxmlformats.org/presentationml/2006/main">
+  <p:cSld>
+    <p:spTree>
+      <p:nvGrpSpPr>
+        <p:cNvPr id="1" name=""/>
+        <p:cNvGrpSpPr/>
+        <p:nvPr/>
+      </p:nvGrpSpPr>
+      <p:grpSpPr>
+        <a:xfrm>
+          <a:off x="0" y="0"/>
+          <a:ext cx="0" cy="0"/>
+          <a:chOff x="0" y="0"/>
+          <a:chExt cx="0" cy="0"/>
+        </a:xfrm>
+      </p:grpSpPr>
+      <p:sp>
+        <p:nvSpPr>
+          <p:cNvPr id="2" name="Title 1"/>
+          <p:cNvSpPr>
+            <a:spLocks noGrp="1"/>
+          </p:cNvSpPr>
+          <p:nvPr>
+            <p:ph type="title"/>
+          </p:nvPr>
+        </p:nvSpPr>
+        <p:spPr>
+          <a:xfrm>
+            <a:off x="304800" y="2186643"/>
+            <a:ext cx="8534400" cy="523220"/>
+          </a:xfrm>
+        </p:spPr>
+        <p:txBody>
+          <a:bodyPr/>
+          <a:lstStyle/>
+          <a:p>
+            <a:r>
+              <a:rPr lang="en-US" dirty="0"/>
+              <a:t>Thank you for your attention!</a:t>
+            </a:r>
+          </a:p>
+        </p:txBody>
+      </p:sp>
+    </p:spTree>
+    <p:extLst>
+      <p:ext uri="{BB962C8B-B14F-4D97-AF65-F5344CB8AC3E}">
+        <p14:creationId xmlns:p14="http://schemas.microsoft.com/office/powerpoint/2010/main" val="2036475844"/>
+      </p:ext>
+    </p:extLst>
+  </p:cSld>
+  <p:clrMapOvr>
+    <a:masterClrMapping/>
+  </p:clrMapOvr>
+</p:sld>
+</file>
+
 <file path=ppt/slides/slide2.xml><?xml version="1.0" encoding="utf-8"?>
 <p:sld xmlns:a="http://schemas.openxmlformats.org/drawingml/2006/main" xmlns:r="http://schemas.openxmlformats.org/officeDocument/2006/relationships" xmlns:p="http://schemas.openxmlformats.org/presentationml/2006/main">
   <p:cSld>
@@ -4401,43 +5155,22 @@
             <p:ph type="title"/>
           </p:nvPr>
         </p:nvSpPr>
-        <p:spPr/>
+        <p:spPr>
+          <a:xfrm>
+            <a:off x="381000" y="243543"/>
+            <a:ext cx="8545672" cy="523220"/>
+          </a:xfrm>
+        </p:spPr>
         <p:txBody>
-          <a:bodyPr/>
+          <a:bodyPr wrap="square" anchor="t">
+            <a:normAutofit/>
+          </a:bodyPr>
           <a:lstStyle/>
           <a:p>
             <a:r>
               <a:rPr lang="de-DE" dirty="0"/>
               <a:t>Motivation</a:t>
             </a:r>
-            <a:endParaRPr lang="en-GB" dirty="0"/>
-          </a:p>
-        </p:txBody>
-      </p:sp>
-      <p:sp>
-        <p:nvSpPr>
-          <p:cNvPr id="4" name="Content Placeholder 3">
-            <a:extLst>
-              <a:ext uri="{FF2B5EF4-FFF2-40B4-BE49-F238E27FC236}">
-                <a16:creationId xmlns:a16="http://schemas.microsoft.com/office/drawing/2014/main" id="{A8E97774-92E3-4E04-9D90-A32D0CB6D1B1}"/>
-              </a:ext>
-            </a:extLst>
-          </p:cNvPr>
-          <p:cNvSpPr>
-            <a:spLocks noGrp="1"/>
-          </p:cNvSpPr>
-          <p:nvPr>
-            <p:ph idx="1"/>
-          </p:nvPr>
-        </p:nvSpPr>
-        <p:spPr/>
-        <p:txBody>
-          <a:bodyPr/>
-          <a:lstStyle/>
-          <a:p>
-            <a:pPr marL="0" indent="0">
-              <a:buNone/>
-            </a:pPr>
             <a:endParaRPr lang="en-GB" dirty="0"/>
           </a:p>
         </p:txBody>
@@ -4464,12 +5197,13 @@
         </p:blipFill>
         <p:spPr>
           <a:xfrm>
-            <a:off x="1371600" y="1047750"/>
-            <a:ext cx="6546742" cy="3542063"/>
+            <a:off x="996950" y="914400"/>
+            <a:ext cx="7302500" cy="3943350"/>
           </a:xfrm>
           <a:prstGeom prst="rect">
             <a:avLst/>
           </a:prstGeom>
+          <a:noFill/>
         </p:spPr>
       </p:pic>
     </p:spTree>
@@ -4504,10 +5238,10 @@
       </p:grpSpPr>
       <p:sp>
         <p:nvSpPr>
-          <p:cNvPr id="4" name="Title 3">
+          <p:cNvPr id="2" name="Titel 1">
             <a:extLst>
               <a:ext uri="{FF2B5EF4-FFF2-40B4-BE49-F238E27FC236}">
-                <a16:creationId xmlns:a16="http://schemas.microsoft.com/office/drawing/2014/main" id="{30C9BDA0-8F15-4D90-81BA-5E4C7E87598F}"/>
+                <a16:creationId xmlns:a16="http://schemas.microsoft.com/office/drawing/2014/main" id="{AF311FAB-AD3C-4964-9198-8FCBF12C9111}"/>
               </a:ext>
             </a:extLst>
           </p:cNvPr>
@@ -4525,22 +5259,17 @@
           <a:p>
             <a:r>
               <a:rPr lang="en-US" dirty="0"/>
-              <a:t>Our</a:t>
-            </a:r>
-            <a:r>
-              <a:rPr lang="de-DE" dirty="0"/>
-              <a:t> Task</a:t>
-            </a:r>
-            <a:endParaRPr lang="en-GB" dirty="0"/>
+              <a:t>Bounding Box Parametrization</a:t>
+            </a:r>
           </a:p>
         </p:txBody>
       </p:sp>
       <p:sp>
         <p:nvSpPr>
-          <p:cNvPr id="5" name="Content Placeholder 4">
+          <p:cNvPr id="3" name="Inhaltsplatzhalter 2">
             <a:extLst>
               <a:ext uri="{FF2B5EF4-FFF2-40B4-BE49-F238E27FC236}">
-                <a16:creationId xmlns:a16="http://schemas.microsoft.com/office/drawing/2014/main" id="{879BE057-F79C-416A-BC4B-8048CEFEFBAF}"/>
+                <a16:creationId xmlns:a16="http://schemas.microsoft.com/office/drawing/2014/main" id="{19BCFA74-BA43-4AED-8291-33BE8E5C855C}"/>
               </a:ext>
             </a:extLst>
           </p:cNvPr>
@@ -4558,15 +5287,19 @@
           <a:p>
             <a:r>
               <a:rPr lang="en-US" dirty="0"/>
-              <a:t>What is </a:t>
-            </a:r>
-            <a:r>
-              <a:rPr lang="en-US" dirty="0" err="1"/>
-              <a:t>Cabb</a:t>
-            </a:r>
-            <a:r>
-              <a:rPr lang="en-US"/>
-              <a:t>?</a:t>
+              <a:t>Delta omega explained?</a:t>
+            </a:r>
+          </a:p>
+          <a:p>
+            <a:r>
+              <a:rPr lang="en-US" dirty="0"/>
+              <a:t>Why do we even need delta omega?</a:t>
+            </a:r>
+          </a:p>
+          <a:p>
+            <a:r>
+              <a:rPr lang="en-US" dirty="0"/>
+              <a:t>Shows why its not a trivial solution</a:t>
             </a:r>
           </a:p>
         </p:txBody>
@@ -4574,7 +5307,7 @@
     </p:spTree>
     <p:extLst>
       <p:ext uri="{BB962C8B-B14F-4D97-AF65-F5344CB8AC3E}">
-        <p14:creationId xmlns:p14="http://schemas.microsoft.com/office/powerpoint/2010/main" val="1885977225"/>
+        <p14:creationId xmlns:p14="http://schemas.microsoft.com/office/powerpoint/2010/main" val="31551848"/>
       </p:ext>
     </p:extLst>
   </p:cSld>
@@ -4603,10 +5336,10 @@
       </p:grpSpPr>
       <p:sp>
         <p:nvSpPr>
-          <p:cNvPr id="2" name="Title 1">
+          <p:cNvPr id="4" name="Title 3">
             <a:extLst>
               <a:ext uri="{FF2B5EF4-FFF2-40B4-BE49-F238E27FC236}">
-                <a16:creationId xmlns:a16="http://schemas.microsoft.com/office/drawing/2014/main" id="{CADFAC11-05D7-429F-85C1-BB1E40DF7034}"/>
+                <a16:creationId xmlns:a16="http://schemas.microsoft.com/office/drawing/2014/main" id="{30C9BDA0-8F15-4D90-81BA-5E4C7E87598F}"/>
               </a:ext>
             </a:extLst>
           </p:cNvPr>
@@ -4623,35 +5356,31 @@
           <a:lstStyle/>
           <a:p>
             <a:r>
-              <a:rPr lang="en-US" dirty="0"/>
-              <a:t>Visualization</a:t>
+              <a:rPr lang="de-DE" dirty="0" err="1"/>
+              <a:t>Crop</a:t>
             </a:r>
             <a:r>
               <a:rPr lang="de-DE" dirty="0"/>
-              <a:t> </a:t>
-            </a:r>
-            <a:r>
-              <a:rPr lang="en-US" dirty="0"/>
-              <a:t>of</a:t>
+              <a:t>-Aware </a:t>
+            </a:r>
+            <a:r>
+              <a:rPr lang="de-DE" dirty="0" err="1"/>
+              <a:t>Bounding</a:t>
             </a:r>
             <a:r>
               <a:rPr lang="de-DE" dirty="0"/>
-              <a:t> </a:t>
-            </a:r>
-            <a:r>
-              <a:rPr lang="en-US" dirty="0" err="1"/>
-              <a:t>Cabb</a:t>
-            </a:r>
-            <a:endParaRPr lang="en-US" dirty="0"/>
+              <a:t> Boxes</a:t>
+            </a:r>
+            <a:endParaRPr lang="en-GB" dirty="0"/>
           </a:p>
         </p:txBody>
       </p:sp>
       <p:sp>
         <p:nvSpPr>
-          <p:cNvPr id="3" name="Content Placeholder 2">
+          <p:cNvPr id="5" name="Content Placeholder 4">
             <a:extLst>
               <a:ext uri="{FF2B5EF4-FFF2-40B4-BE49-F238E27FC236}">
-                <a16:creationId xmlns:a16="http://schemas.microsoft.com/office/drawing/2014/main" id="{E792780D-FF8B-464B-A133-01C1B809D660}"/>
+                <a16:creationId xmlns:a16="http://schemas.microsoft.com/office/drawing/2014/main" id="{879BE057-F79C-416A-BC4B-8048CEFEFBAF}"/>
               </a:ext>
             </a:extLst>
           </p:cNvPr>
@@ -4662,44 +5391,78 @@
             <p:ph idx="1"/>
           </p:nvPr>
         </p:nvSpPr>
-        <p:spPr/>
+        <p:spPr>
+          <a:xfrm>
+            <a:off x="381000" y="914400"/>
+            <a:ext cx="4708454" cy="3943350"/>
+          </a:xfrm>
+        </p:spPr>
         <p:txBody>
           <a:bodyPr/>
           <a:lstStyle/>
           <a:p>
             <a:r>
-              <a:rPr lang="en-GB" dirty="0"/>
-              <a:t>Target vs </a:t>
-            </a:r>
-            <a:r>
-              <a:rPr lang="en-GB" dirty="0" err="1"/>
-              <a:t>cabb</a:t>
-            </a:r>
-            <a:r>
-              <a:rPr lang="en-GB" dirty="0"/>
-              <a:t> target</a:t>
-            </a:r>
-          </a:p>
-          <a:p>
-            <a:r>
-              <a:rPr lang="en-GB" dirty="0"/>
-              <a:t>Maybe hardcode a prediction that imagines a larger prediction and show how </a:t>
-            </a:r>
-            <a:r>
-              <a:rPr lang="en-GB" dirty="0" err="1"/>
-              <a:t>cabb</a:t>
-            </a:r>
-            <a:r>
-              <a:rPr lang="en-GB" dirty="0"/>
-              <a:t> behaves and what the loss is</a:t>
-            </a:r>
+              <a:rPr lang="en-US" dirty="0"/>
+              <a:t>Network is allowed to hallucinate outside the crop area</a:t>
+            </a:r>
+          </a:p>
+          <a:p>
+            <a:r>
+              <a:rPr lang="en-US" dirty="0"/>
+              <a:t>Can reduce the bias against big objects which are cut</a:t>
+            </a:r>
+          </a:p>
+          <a:p>
+            <a:r>
+              <a:rPr lang="en-US" dirty="0"/>
+              <a:t>Training on crops with fine details can increase performance on small/far objects</a:t>
+            </a:r>
+          </a:p>
+          <a:p>
+            <a:endParaRPr lang="en-US" dirty="0"/>
+          </a:p>
+          <a:p>
+            <a:pPr marL="0" indent="0">
+              <a:buNone/>
+            </a:pPr>
+            <a:endParaRPr lang="en-US" dirty="0"/>
           </a:p>
         </p:txBody>
       </p:sp>
+      <p:pic>
+        <p:nvPicPr>
+          <p:cNvPr id="13" name="Grafik 12">
+            <a:extLst>
+              <a:ext uri="{FF2B5EF4-FFF2-40B4-BE49-F238E27FC236}">
+                <a16:creationId xmlns:a16="http://schemas.microsoft.com/office/drawing/2014/main" id="{FF7A492A-FA54-4B67-8A3B-536D293479E5}"/>
+              </a:ext>
+            </a:extLst>
+          </p:cNvPr>
+          <p:cNvPicPr>
+            <a:picLocks noChangeAspect="1"/>
+          </p:cNvPicPr>
+          <p:nvPr/>
+        </p:nvPicPr>
+        <p:blipFill>
+          <a:blip r:embed="rId3"/>
+          <a:stretch>
+            <a:fillRect/>
+          </a:stretch>
+        </p:blipFill>
+        <p:spPr>
+          <a:xfrm>
+            <a:off x="5089454" y="917155"/>
+            <a:ext cx="3673546" cy="3332025"/>
+          </a:xfrm>
+          <a:prstGeom prst="rect">
+            <a:avLst/>
+          </a:prstGeom>
+        </p:spPr>
+      </p:pic>
     </p:spTree>
     <p:extLst>
       <p:ext uri="{BB962C8B-B14F-4D97-AF65-F5344CB8AC3E}">
-        <p14:creationId xmlns:p14="http://schemas.microsoft.com/office/powerpoint/2010/main" val="2489557210"/>
+        <p14:creationId xmlns:p14="http://schemas.microsoft.com/office/powerpoint/2010/main" val="1885977225"/>
       </p:ext>
     </p:extLst>
   </p:cSld>
@@ -4731,7 +5494,7 @@
           <p:cNvPr id="2" name="Title 1">
             <a:extLst>
               <a:ext uri="{FF2B5EF4-FFF2-40B4-BE49-F238E27FC236}">
-                <a16:creationId xmlns:a16="http://schemas.microsoft.com/office/drawing/2014/main" id="{2D09D21D-85D3-45EE-901C-55BD06588083}"/>
+                <a16:creationId xmlns:a16="http://schemas.microsoft.com/office/drawing/2014/main" id="{CADFAC11-05D7-429F-85C1-BB1E40DF7034}"/>
               </a:ext>
             </a:extLst>
           </p:cNvPr>
@@ -4749,8 +5512,25 @@
           <a:p>
             <a:r>
               <a:rPr lang="en-US" dirty="0"/>
-              <a:t>Results/Comparison</a:t>
-            </a:r>
+              <a:t>Visualization</a:t>
+            </a:r>
+            <a:r>
+              <a:rPr lang="de-DE" dirty="0"/>
+              <a:t> </a:t>
+            </a:r>
+            <a:r>
+              <a:rPr lang="en-US" dirty="0"/>
+              <a:t>of</a:t>
+            </a:r>
+            <a:r>
+              <a:rPr lang="de-DE" dirty="0"/>
+              <a:t> </a:t>
+            </a:r>
+            <a:r>
+              <a:rPr lang="en-US" dirty="0" err="1"/>
+              <a:t>Cabb</a:t>
+            </a:r>
+            <a:endParaRPr lang="en-US" dirty="0"/>
           </a:p>
         </p:txBody>
       </p:sp>
@@ -4759,7 +5539,7 @@
           <p:cNvPr id="3" name="Content Placeholder 2">
             <a:extLst>
               <a:ext uri="{FF2B5EF4-FFF2-40B4-BE49-F238E27FC236}">
-                <a16:creationId xmlns:a16="http://schemas.microsoft.com/office/drawing/2014/main" id="{CFB73C6E-E25A-4AD9-9620-74058DEEA275}"/>
+                <a16:creationId xmlns:a16="http://schemas.microsoft.com/office/drawing/2014/main" id="{E792780D-FF8B-464B-A133-01C1B809D660}"/>
               </a:ext>
             </a:extLst>
           </p:cNvPr>
@@ -4770,34 +5550,165 @@
             <p:ph idx="1"/>
           </p:nvPr>
         </p:nvSpPr>
-        <p:spPr/>
+        <p:spPr>
+          <a:xfrm>
+            <a:off x="381000" y="3648684"/>
+            <a:ext cx="8534400" cy="1209065"/>
+          </a:xfrm>
+        </p:spPr>
         <p:txBody>
           <a:bodyPr/>
           <a:lstStyle/>
           <a:p>
-            <a:r>
-              <a:rPr lang="en-US" dirty="0"/>
-              <a:t>Final values</a:t>
-            </a:r>
-          </a:p>
-          <a:p>
-            <a:r>
-              <a:rPr lang="en-US" dirty="0"/>
-              <a:t>Graph with history?</a:t>
-            </a:r>
-          </a:p>
-          <a:p>
-            <a:r>
-              <a:rPr lang="en-US" dirty="0"/>
-              <a:t>Training speed difference(look when episode saves were created)!</a:t>
-            </a:r>
+            <a:pPr marL="0" indent="0">
+              <a:buNone/>
+            </a:pPr>
+            <a:endParaRPr lang="en-GB" dirty="0"/>
           </a:p>
         </p:txBody>
       </p:sp>
+      <p:pic>
+        <p:nvPicPr>
+          <p:cNvPr id="4" name="Grafik 3" descr="Ein Bild, das Text, draußen, Straße enthält.&#10;&#10;Automatisch generierte Beschreibung">
+            <a:extLst>
+              <a:ext uri="{FF2B5EF4-FFF2-40B4-BE49-F238E27FC236}">
+                <a16:creationId xmlns:a16="http://schemas.microsoft.com/office/drawing/2014/main" id="{019DB30C-1759-4DF1-AE4C-E17C76EE6AB0}"/>
+              </a:ext>
+            </a:extLst>
+          </p:cNvPr>
+          <p:cNvPicPr>
+            <a:picLocks noChangeAspect="1"/>
+          </p:cNvPicPr>
+          <p:nvPr/>
+        </p:nvPicPr>
+        <p:blipFill>
+          <a:blip r:embed="rId3"/>
+          <a:stretch>
+            <a:fillRect/>
+          </a:stretch>
+        </p:blipFill>
+        <p:spPr>
+          <a:xfrm>
+            <a:off x="440857" y="912257"/>
+            <a:ext cx="4093431" cy="2130174"/>
+          </a:xfrm>
+          <a:prstGeom prst="rect">
+            <a:avLst/>
+          </a:prstGeom>
+        </p:spPr>
+      </p:pic>
+      <p:sp>
+        <p:nvSpPr>
+          <p:cNvPr id="5" name="Textfeld 4">
+            <a:extLst>
+              <a:ext uri="{FF2B5EF4-FFF2-40B4-BE49-F238E27FC236}">
+                <a16:creationId xmlns:a16="http://schemas.microsoft.com/office/drawing/2014/main" id="{BA942420-B2DF-4312-9F77-010105064C64}"/>
+              </a:ext>
+            </a:extLst>
+          </p:cNvPr>
+          <p:cNvSpPr txBox="1"/>
+          <p:nvPr/>
+        </p:nvSpPr>
+        <p:spPr>
+          <a:xfrm>
+            <a:off x="436738" y="3187021"/>
+            <a:ext cx="4093431" cy="461665"/>
+          </a:xfrm>
+          <a:prstGeom prst="rect">
+            <a:avLst/>
+          </a:prstGeom>
+          <a:noFill/>
+        </p:spPr>
+        <p:txBody>
+          <a:bodyPr wrap="square" rtlCol="0">
+            <a:spAutoFit/>
+          </a:bodyPr>
+          <a:lstStyle/>
+          <a:p>
+            <a:r>
+              <a:rPr lang="en-US" dirty="0"/>
+              <a:t>Without</a:t>
+            </a:r>
+            <a:r>
+              <a:rPr lang="de-DE" dirty="0"/>
+              <a:t> CABB</a:t>
+            </a:r>
+          </a:p>
+        </p:txBody>
+      </p:sp>
+      <p:sp>
+        <p:nvSpPr>
+          <p:cNvPr id="6" name="Textfeld 5">
+            <a:extLst>
+              <a:ext uri="{FF2B5EF4-FFF2-40B4-BE49-F238E27FC236}">
+                <a16:creationId xmlns:a16="http://schemas.microsoft.com/office/drawing/2014/main" id="{5B6482A4-EF81-4EB4-B206-D70873A4FFB9}"/>
+              </a:ext>
+            </a:extLst>
+          </p:cNvPr>
+          <p:cNvSpPr txBox="1"/>
+          <p:nvPr/>
+        </p:nvSpPr>
+        <p:spPr>
+          <a:xfrm>
+            <a:off x="4657212" y="3187020"/>
+            <a:ext cx="4093431" cy="461665"/>
+          </a:xfrm>
+          <a:prstGeom prst="rect">
+            <a:avLst/>
+          </a:prstGeom>
+          <a:noFill/>
+        </p:spPr>
+        <p:txBody>
+          <a:bodyPr wrap="square" rtlCol="0">
+            <a:spAutoFit/>
+          </a:bodyPr>
+          <a:lstStyle/>
+          <a:p>
+            <a:r>
+              <a:rPr lang="en-US" dirty="0"/>
+              <a:t>With</a:t>
+            </a:r>
+            <a:r>
+              <a:rPr lang="de-DE" dirty="0"/>
+              <a:t> CABB</a:t>
+            </a:r>
+          </a:p>
+        </p:txBody>
+      </p:sp>
+      <p:pic>
+        <p:nvPicPr>
+          <p:cNvPr id="7" name="Grafik 6" descr="Ein Bild, das Text, draußen, Straße enthält.&#10;&#10;Automatisch generierte Beschreibung">
+            <a:extLst>
+              <a:ext uri="{FF2B5EF4-FFF2-40B4-BE49-F238E27FC236}">
+                <a16:creationId xmlns:a16="http://schemas.microsoft.com/office/drawing/2014/main" id="{B359E9AD-B13F-4042-BD52-83B942F326F2}"/>
+              </a:ext>
+            </a:extLst>
+          </p:cNvPr>
+          <p:cNvPicPr>
+            <a:picLocks noChangeAspect="1"/>
+          </p:cNvPicPr>
+          <p:nvPr/>
+        </p:nvPicPr>
+        <p:blipFill>
+          <a:blip r:embed="rId4"/>
+          <a:stretch>
+            <a:fillRect/>
+          </a:stretch>
+        </p:blipFill>
+        <p:spPr>
+          <a:xfrm>
+            <a:off x="4661332" y="914400"/>
+            <a:ext cx="4085193" cy="2125887"/>
+          </a:xfrm>
+          <a:prstGeom prst="rect">
+            <a:avLst/>
+          </a:prstGeom>
+        </p:spPr>
+      </p:pic>
     </p:spTree>
     <p:extLst>
       <p:ext uri="{BB962C8B-B14F-4D97-AF65-F5344CB8AC3E}">
-        <p14:creationId xmlns:p14="http://schemas.microsoft.com/office/powerpoint/2010/main" val="803320101"/>
+        <p14:creationId xmlns:p14="http://schemas.microsoft.com/office/powerpoint/2010/main" val="2489557210"/>
       </p:ext>
     </p:extLst>
   </p:cSld>
@@ -4826,7 +5737,13 @@
       </p:grpSpPr>
       <p:sp>
         <p:nvSpPr>
-          <p:cNvPr id="2" name="Title 1"/>
+          <p:cNvPr id="2" name="Titel 1">
+            <a:extLst>
+              <a:ext uri="{FF2B5EF4-FFF2-40B4-BE49-F238E27FC236}">
+                <a16:creationId xmlns:a16="http://schemas.microsoft.com/office/drawing/2014/main" id="{2DE899C9-ECB8-4209-B44A-D55809197041}"/>
+              </a:ext>
+            </a:extLst>
+          </p:cNvPr>
           <p:cNvSpPr>
             <a:spLocks noGrp="1"/>
           </p:cNvSpPr>
@@ -4834,19 +5751,48 @@
             <p:ph type="title"/>
           </p:nvPr>
         </p:nvSpPr>
-        <p:spPr>
-          <a:xfrm>
-            <a:off x="304800" y="2186643"/>
-            <a:ext cx="8534400" cy="523220"/>
-          </a:xfrm>
-        </p:spPr>
+        <p:spPr/>
         <p:txBody>
           <a:bodyPr/>
           <a:lstStyle/>
           <a:p>
             <a:r>
               <a:rPr lang="en-US" dirty="0"/>
-              <a:t>Thank you for your attention!</a:t>
+              <a:t>Training Setting</a:t>
+            </a:r>
+          </a:p>
+        </p:txBody>
+      </p:sp>
+      <p:sp>
+        <p:nvSpPr>
+          <p:cNvPr id="3" name="Inhaltsplatzhalter 2">
+            <a:extLst>
+              <a:ext uri="{FF2B5EF4-FFF2-40B4-BE49-F238E27FC236}">
+                <a16:creationId xmlns:a16="http://schemas.microsoft.com/office/drawing/2014/main" id="{855BEFD4-C452-40AA-8020-77316D8CF61E}"/>
+              </a:ext>
+            </a:extLst>
+          </p:cNvPr>
+          <p:cNvSpPr>
+            <a:spLocks noGrp="1"/>
+          </p:cNvSpPr>
+          <p:nvPr>
+            <p:ph idx="1"/>
+          </p:nvPr>
+        </p:nvSpPr>
+        <p:spPr/>
+        <p:txBody>
+          <a:bodyPr/>
+          <a:lstStyle/>
+          <a:p>
+            <a:r>
+              <a:rPr lang="en-US" dirty="0"/>
+              <a:t>Image size, Crop size</a:t>
+            </a:r>
+          </a:p>
+          <a:p>
+            <a:r>
+              <a:rPr lang="en-US" dirty="0"/>
+              <a:t>Image per GPU</a:t>
             </a:r>
           </a:p>
         </p:txBody>
@@ -4854,7 +5800,7 @@
     </p:spTree>
     <p:extLst>
       <p:ext uri="{BB962C8B-B14F-4D97-AF65-F5344CB8AC3E}">
-        <p14:creationId xmlns:p14="http://schemas.microsoft.com/office/powerpoint/2010/main" val="2036475844"/>
+        <p14:creationId xmlns:p14="http://schemas.microsoft.com/office/powerpoint/2010/main" val="2836184599"/>
       </p:ext>
     </p:extLst>
   </p:cSld>

</xml_diff>

<commit_message>
improved presentation and added result plots
</commit_message>
<xml_diff>
--- a/Crop-Aware Panoptic Segmentation.pptx
+++ b/Crop-Aware Panoptic Segmentation.pptx
@@ -5,10 +5,10 @@
     <p:sldMasterId id="2147483653" r:id="rId1"/>
   </p:sldMasterIdLst>
   <p:notesMasterIdLst>
-    <p:notesMasterId r:id="rId11"/>
+    <p:notesMasterId r:id="rId12"/>
   </p:notesMasterIdLst>
   <p:handoutMasterIdLst>
-    <p:handoutMasterId r:id="rId12"/>
+    <p:handoutMasterId r:id="rId13"/>
   </p:handoutMasterIdLst>
   <p:sldIdLst>
     <p:sldId id="607" r:id="rId2"/>
@@ -19,12 +19,13 @@
     <p:sldId id="614" r:id="rId7"/>
     <p:sldId id="617" r:id="rId8"/>
     <p:sldId id="615" r:id="rId9"/>
-    <p:sldId id="604" r:id="rId10"/>
+    <p:sldId id="619" r:id="rId10"/>
+    <p:sldId id="604" r:id="rId11"/>
   </p:sldIdLst>
   <p:sldSz cx="9144000" cy="5143500" type="screen16x9"/>
   <p:notesSz cx="10234613" cy="7099300"/>
   <p:custDataLst>
-    <p:tags r:id="rId13"/>
+    <p:tags r:id="rId14"/>
   </p:custDataLst>
   <p:defaultTextStyle>
     <a:defPPr>
@@ -187,7 +188,7 @@
 <file path=ppt/revisionInfo.xml><?xml version="1.0" encoding="utf-8"?>
 <p1510:revInfo xmlns:a="http://schemas.openxmlformats.org/drawingml/2006/main" xmlns:r="http://schemas.openxmlformats.org/officeDocument/2006/relationships" xmlns:p1510="http://schemas.microsoft.com/office/powerpoint/2015/10/main">
   <p1510:revLst>
-    <p1510:client id="{80991716-2D59-4026-B09E-1447EF58DD18}" v="11" dt="2021-07-25T08:57:12.232"/>
+    <p1510:client id="{2CD5F5D6-88A3-4631-A66A-40A03704DD16}" v="5" dt="2021-07-26T10:38:08.515"/>
     <p1510:client id="{E8785D74-9879-42C5-9058-5D91577AAC50}" v="524" dt="2021-07-25T10:43:13.034"/>
   </p1510:revLst>
 </p1510:revInfo>
@@ -197,8 +198,8 @@
 <pc:chgInfo xmlns:a="http://schemas.openxmlformats.org/drawingml/2006/main" xmlns:r="http://schemas.openxmlformats.org/officeDocument/2006/relationships" xmlns:ac="http://schemas.microsoft.com/office/drawing/2013/main/command" xmlns:pc="http://schemas.microsoft.com/office/powerpoint/2013/main/command">
   <pc:docChgLst>
     <pc:chgData name="Yannick Vogt" userId="860741af1eec8ecc" providerId="LiveId" clId="{2CD5F5D6-88A3-4631-A66A-40A03704DD16}"/>
-    <pc:docChg chg="custSel addSld modSld sldOrd modMainMaster">
-      <pc:chgData name="Yannick Vogt" userId="860741af1eec8ecc" providerId="LiveId" clId="{2CD5F5D6-88A3-4631-A66A-40A03704DD16}" dt="2021-07-23T09:18:37.192" v="523" actId="5793"/>
+    <pc:docChg chg="undo custSel addSld modSld sldOrd modMainMaster">
+      <pc:chgData name="Yannick Vogt" userId="860741af1eec8ecc" providerId="LiveId" clId="{2CD5F5D6-88A3-4631-A66A-40A03704DD16}" dt="2021-07-26T10:39:51.049" v="1164" actId="1076"/>
       <pc:docMkLst>
         <pc:docMk/>
       </pc:docMkLst>
@@ -271,8 +272,8 @@
           </ac:picMkLst>
         </pc:picChg>
       </pc:sldChg>
-      <pc:sldChg chg="addSp delSp modSp new mod chgLayout">
-        <pc:chgData name="Yannick Vogt" userId="860741af1eec8ecc" providerId="LiveId" clId="{2CD5F5D6-88A3-4631-A66A-40A03704DD16}" dt="2021-07-23T08:15:56.316" v="232" actId="790"/>
+      <pc:sldChg chg="addSp delSp modSp new mod chgLayout modNotesTx">
+        <pc:chgData name="Yannick Vogt" userId="860741af1eec8ecc" providerId="LiveId" clId="{2CD5F5D6-88A3-4631-A66A-40A03704DD16}" dt="2021-07-26T08:49:33.713" v="618" actId="20577"/>
         <pc:sldMkLst>
           <pc:docMk/>
           <pc:sldMk cId="1885977225" sldId="613"/>
@@ -311,7 +312,7 @@
         </pc:spChg>
       </pc:sldChg>
       <pc:sldChg chg="modSp new mod">
-        <pc:chgData name="Yannick Vogt" userId="860741af1eec8ecc" providerId="LiveId" clId="{2CD5F5D6-88A3-4631-A66A-40A03704DD16}" dt="2021-07-23T08:17:41.449" v="396" actId="20577"/>
+        <pc:chgData name="Yannick Vogt" userId="860741af1eec8ecc" providerId="LiveId" clId="{2CD5F5D6-88A3-4631-A66A-40A03704DD16}" dt="2021-07-26T10:01:37.454" v="992" actId="207"/>
         <pc:sldMkLst>
           <pc:docMk/>
           <pc:sldMk cId="2489557210" sldId="614"/>
@@ -325,7 +326,7 @@
           </ac:spMkLst>
         </pc:spChg>
         <pc:spChg chg="mod">
-          <ac:chgData name="Yannick Vogt" userId="860741af1eec8ecc" providerId="LiveId" clId="{2CD5F5D6-88A3-4631-A66A-40A03704DD16}" dt="2021-07-23T08:17:41.449" v="396" actId="20577"/>
+          <ac:chgData name="Yannick Vogt" userId="860741af1eec8ecc" providerId="LiveId" clId="{2CD5F5D6-88A3-4631-A66A-40A03704DD16}" dt="2021-07-26T10:01:37.454" v="992" actId="207"/>
           <ac:spMkLst>
             <pc:docMk/>
             <pc:sldMk cId="2489557210" sldId="614"/>
@@ -333,14 +334,14 @@
           </ac:spMkLst>
         </pc:spChg>
       </pc:sldChg>
-      <pc:sldChg chg="modSp new mod">
-        <pc:chgData name="Yannick Vogt" userId="860741af1eec8ecc" providerId="LiveId" clId="{2CD5F5D6-88A3-4631-A66A-40A03704DD16}" dt="2021-07-23T08:18:44.141" v="514" actId="20577"/>
+      <pc:sldChg chg="addSp modSp new mod modNotesTx">
+        <pc:chgData name="Yannick Vogt" userId="860741af1eec8ecc" providerId="LiveId" clId="{2CD5F5D6-88A3-4631-A66A-40A03704DD16}" dt="2021-07-26T09:57:26.445" v="900" actId="20577"/>
         <pc:sldMkLst>
           <pc:docMk/>
           <pc:sldMk cId="803320101" sldId="615"/>
         </pc:sldMkLst>
         <pc:spChg chg="mod">
-          <ac:chgData name="Yannick Vogt" userId="860741af1eec8ecc" providerId="LiveId" clId="{2CD5F5D6-88A3-4631-A66A-40A03704DD16}" dt="2021-07-23T08:18:03.103" v="415" actId="20577"/>
+          <ac:chgData name="Yannick Vogt" userId="860741af1eec8ecc" providerId="LiveId" clId="{2CD5F5D6-88A3-4631-A66A-40A03704DD16}" dt="2021-07-26T09:57:18.521" v="897" actId="20577"/>
           <ac:spMkLst>
             <pc:docMk/>
             <pc:sldMk cId="803320101" sldId="615"/>
@@ -348,13 +349,83 @@
           </ac:spMkLst>
         </pc:spChg>
         <pc:spChg chg="mod">
-          <ac:chgData name="Yannick Vogt" userId="860741af1eec8ecc" providerId="LiveId" clId="{2CD5F5D6-88A3-4631-A66A-40A03704DD16}" dt="2021-07-23T08:18:44.141" v="514" actId="20577"/>
+          <ac:chgData name="Yannick Vogt" userId="860741af1eec8ecc" providerId="LiveId" clId="{2CD5F5D6-88A3-4631-A66A-40A03704DD16}" dt="2021-07-26T09:57:26.445" v="900" actId="20577"/>
           <ac:spMkLst>
             <pc:docMk/>
             <pc:sldMk cId="803320101" sldId="615"/>
             <ac:spMk id="3" creationId="{CFB73C6E-E25A-4AD9-9620-74058DEEA275}"/>
           </ac:spMkLst>
         </pc:spChg>
+        <pc:picChg chg="add mod">
+          <ac:chgData name="Yannick Vogt" userId="860741af1eec8ecc" providerId="LiveId" clId="{2CD5F5D6-88A3-4631-A66A-40A03704DD16}" dt="2021-07-26T09:39:27.968" v="715" actId="1076"/>
+          <ac:picMkLst>
+            <pc:docMk/>
+            <pc:sldMk cId="803320101" sldId="615"/>
+            <ac:picMk id="5" creationId="{38275DBB-6F88-4CFE-B61C-28C8F930DCE4}"/>
+          </ac:picMkLst>
+        </pc:picChg>
+        <pc:picChg chg="add mod">
+          <ac:chgData name="Yannick Vogt" userId="860741af1eec8ecc" providerId="LiveId" clId="{2CD5F5D6-88A3-4631-A66A-40A03704DD16}" dt="2021-07-26T09:40:12.817" v="722" actId="14100"/>
+          <ac:picMkLst>
+            <pc:docMk/>
+            <pc:sldMk cId="803320101" sldId="615"/>
+            <ac:picMk id="7" creationId="{99CD42C8-0441-44C1-AB6E-75402FFBC4FB}"/>
+          </ac:picMkLst>
+        </pc:picChg>
+      </pc:sldChg>
+      <pc:sldChg chg="modSp mod">
+        <pc:chgData name="Yannick Vogt" userId="860741af1eec8ecc" providerId="LiveId" clId="{2CD5F5D6-88A3-4631-A66A-40A03704DD16}" dt="2021-07-26T10:33:41.305" v="994" actId="255"/>
+        <pc:sldMkLst>
+          <pc:docMk/>
+          <pc:sldMk cId="2836184599" sldId="617"/>
+        </pc:sldMkLst>
+        <pc:spChg chg="mod">
+          <ac:chgData name="Yannick Vogt" userId="860741af1eec8ecc" providerId="LiveId" clId="{2CD5F5D6-88A3-4631-A66A-40A03704DD16}" dt="2021-07-26T10:33:41.305" v="994" actId="255"/>
+          <ac:spMkLst>
+            <pc:docMk/>
+            <pc:sldMk cId="2836184599" sldId="617"/>
+            <ac:spMk id="3" creationId="{855BEFD4-C452-40AA-8020-77316D8CF61E}"/>
+          </ac:spMkLst>
+        </pc:spChg>
+      </pc:sldChg>
+      <pc:sldChg chg="addSp modSp new mod">
+        <pc:chgData name="Yannick Vogt" userId="860741af1eec8ecc" providerId="LiveId" clId="{2CD5F5D6-88A3-4631-A66A-40A03704DD16}" dt="2021-07-26T10:39:51.049" v="1164" actId="1076"/>
+        <pc:sldMkLst>
+          <pc:docMk/>
+          <pc:sldMk cId="2484015150" sldId="619"/>
+        </pc:sldMkLst>
+        <pc:spChg chg="mod">
+          <ac:chgData name="Yannick Vogt" userId="860741af1eec8ecc" providerId="LiveId" clId="{2CD5F5D6-88A3-4631-A66A-40A03704DD16}" dt="2021-07-26T09:57:33.009" v="916" actId="20577"/>
+          <ac:spMkLst>
+            <pc:docMk/>
+            <pc:sldMk cId="2484015150" sldId="619"/>
+            <ac:spMk id="2" creationId="{2FCE780E-3FF4-421C-964C-B75E1A39EFF2}"/>
+          </ac:spMkLst>
+        </pc:spChg>
+        <pc:spChg chg="mod">
+          <ac:chgData name="Yannick Vogt" userId="860741af1eec8ecc" providerId="LiveId" clId="{2CD5F5D6-88A3-4631-A66A-40A03704DD16}" dt="2021-07-26T10:39:40.635" v="1162" actId="20577"/>
+          <ac:spMkLst>
+            <pc:docMk/>
+            <pc:sldMk cId="2484015150" sldId="619"/>
+            <ac:spMk id="3" creationId="{D3E3E94D-EF3A-4FD9-ADD1-D1042230A624}"/>
+          </ac:spMkLst>
+        </pc:spChg>
+        <pc:graphicFrameChg chg="add mod modGraphic">
+          <ac:chgData name="Yannick Vogt" userId="860741af1eec8ecc" providerId="LiveId" clId="{2CD5F5D6-88A3-4631-A66A-40A03704DD16}" dt="2021-07-26T10:39:51.049" v="1164" actId="1076"/>
+          <ac:graphicFrameMkLst>
+            <pc:docMk/>
+            <pc:sldMk cId="2484015150" sldId="619"/>
+            <ac:graphicFrameMk id="4" creationId="{20FEEC53-DE56-42DB-8905-F6057BC6BC0D}"/>
+          </ac:graphicFrameMkLst>
+        </pc:graphicFrameChg>
+        <pc:graphicFrameChg chg="add mod modGraphic">
+          <ac:chgData name="Yannick Vogt" userId="860741af1eec8ecc" providerId="LiveId" clId="{2CD5F5D6-88A3-4631-A66A-40A03704DD16}" dt="2021-07-26T10:39:46.093" v="1163" actId="1076"/>
+          <ac:graphicFrameMkLst>
+            <pc:docMk/>
+            <pc:sldMk cId="2484015150" sldId="619"/>
+            <ac:graphicFrameMk id="5" creationId="{3D061807-5988-4D6D-8313-9213B56228B6}"/>
+          </ac:graphicFrameMkLst>
+        </pc:graphicFrameChg>
       </pc:sldChg>
       <pc:sldMasterChg chg="modSldLayout">
         <pc:chgData name="Yannick Vogt" userId="860741af1eec8ecc" providerId="LiveId" clId="{2CD5F5D6-88A3-4631-A66A-40A03704DD16}" dt="2021-07-23T08:06:29.750" v="0" actId="478"/>
@@ -792,7 +863,7 @@
           <a:p>
             <a:fld id="{4E9DBEC1-03D6-8C41-96E3-520E1D7FD629}" type="datetimeFigureOut">
               <a:rPr lang="en-US" smtClean="0"/>
-              <a:t>7/25/2021</a:t>
+              <a:t>7/26/2021</a:t>
             </a:fld>
             <a:endParaRPr lang="en-US"/>
           </a:p>
@@ -858,7 +929,7 @@
           <a:p>
             <a:fld id="{1FAA035C-FB08-0242-AF90-D9F53D6B6D73}" type="slidenum">
               <a:rPr lang="en-US" smtClean="0"/>
-              <a:t>‹Nr.›</a:t>
+              <a:t>‹#›</a:t>
             </a:fld>
             <a:endParaRPr lang="en-US"/>
           </a:p>
@@ -953,7 +1024,7 @@
               </a14:hiddenEffects>
             </a:ext>
             <a:ext uri="{FAA26D3D-D897-4be2-8F04-BA451C77F1D7}">
-              <ma14:placeholderFlag xmlns="" xmlns:ma14="http://schemas.microsoft.com/office/mac/drawingml/2011/main" val="1"/>
+              <ma14:placeholderFlag xmlns:ma14="http://schemas.microsoft.com/office/mac/drawingml/2011/main" xmlns="" val="1"/>
             </a:ext>
           </a:extLst>
         </p:spPr>
@@ -1032,7 +1103,7 @@
               </a14:hiddenEffects>
             </a:ext>
             <a:ext uri="{FAA26D3D-D897-4be2-8F04-BA451C77F1D7}">
-              <ma14:placeholderFlag xmlns="" xmlns:ma14="http://schemas.microsoft.com/office/mac/drawingml/2011/main" val="1"/>
+              <ma14:placeholderFlag xmlns:ma14="http://schemas.microsoft.com/office/mac/drawingml/2011/main" xmlns="" val="1"/>
             </a:ext>
           </a:extLst>
         </p:spPr>
@@ -1157,7 +1228,7 @@
               </a14:hiddenEffects>
             </a:ext>
             <a:ext uri="{FAA26D3D-D897-4be2-8F04-BA451C77F1D7}">
-              <ma14:placeholderFlag xmlns="" xmlns:ma14="http://schemas.microsoft.com/office/mac/drawingml/2011/main" val="1"/>
+              <ma14:placeholderFlag xmlns:ma14="http://schemas.microsoft.com/office/mac/drawingml/2011/main" xmlns="" val="1"/>
             </a:ext>
           </a:extLst>
         </p:spPr>
@@ -1258,7 +1329,7 @@
               </a14:hiddenEffects>
             </a:ext>
             <a:ext uri="{FAA26D3D-D897-4be2-8F04-BA451C77F1D7}">
-              <ma14:placeholderFlag xmlns="" xmlns:ma14="http://schemas.microsoft.com/office/mac/drawingml/2011/main" val="1"/>
+              <ma14:placeholderFlag xmlns:ma14="http://schemas.microsoft.com/office/mac/drawingml/2011/main" xmlns="" val="1"/>
             </a:ext>
           </a:extLst>
         </p:spPr>
@@ -1337,7 +1408,7 @@
               </a14:hiddenEffects>
             </a:ext>
             <a:ext uri="{FAA26D3D-D897-4be2-8F04-BA451C77F1D7}">
-              <ma14:placeholderFlag xmlns="" xmlns:ma14="http://schemas.microsoft.com/office/mac/drawingml/2011/main" val="1"/>
+              <ma14:placeholderFlag xmlns:ma14="http://schemas.microsoft.com/office/mac/drawingml/2011/main" xmlns="" val="1"/>
             </a:ext>
           </a:extLst>
         </p:spPr>
@@ -1364,7 +1435,7 @@
               <a:pPr>
                 <a:defRPr/>
               </a:pPr>
-              <a:t>‹Nr.›</a:t>
+              <a:t>‹#›</a:t>
             </a:fld>
             <a:endParaRPr lang="en-US"/>
           </a:p>
@@ -1808,9 +1879,18 @@
           <a:lstStyle/>
           <a:p>
             <a:r>
-              <a:rPr lang="en-US"/>
+              <a:rPr lang="en-US" dirty="0"/>
               <a:t>Explain cases, maybe also show a O2 version</a:t>
             </a:r>
+          </a:p>
+          <a:p>
+            <a:r>
+              <a:rPr lang="en-US" dirty="0"/>
+              <a:t>only outside can be modified</a:t>
+            </a:r>
+          </a:p>
+          <a:p>
+            <a:endParaRPr lang="en-US" dirty="0"/>
           </a:p>
         </p:txBody>
       </p:sp>
@@ -2146,8 +2226,20 @@
           <a:lstStyle/>
           <a:p>
             <a:r>
-              <a:rPr lang="en-US"/>
-              <a:t>If the results are worse it could be based on the unaccounted case</a:t>
+              <a:rPr lang="en-US" dirty="0"/>
+              <a:t>Loss is lower (as we expected, perhaps we would need to weight this loss higher)</a:t>
+            </a:r>
+          </a:p>
+          <a:p>
+            <a:r>
+              <a:rPr lang="en-US" dirty="0"/>
+              <a:t>Loss has spikes, perhaps based on missing case</a:t>
+            </a:r>
+          </a:p>
+          <a:p>
+            <a:r>
+              <a:rPr lang="en-US" dirty="0"/>
+              <a:t>Test on 500 images</a:t>
             </a:r>
           </a:p>
         </p:txBody>
@@ -2195,6 +2287,96 @@
 </file>
 
 <file path=ppt/notesSlides/notesSlide6.xml><?xml version="1.0" encoding="utf-8"?>
+<p:notes xmlns:a="http://schemas.openxmlformats.org/drawingml/2006/main" xmlns:r="http://schemas.openxmlformats.org/officeDocument/2006/relationships" xmlns:p="http://schemas.openxmlformats.org/presentationml/2006/main">
+  <p:cSld>
+    <p:spTree>
+      <p:nvGrpSpPr>
+        <p:cNvPr id="1" name=""/>
+        <p:cNvGrpSpPr/>
+        <p:nvPr/>
+      </p:nvGrpSpPr>
+      <p:grpSpPr>
+        <a:xfrm>
+          <a:off x="0" y="0"/>
+          <a:ext cx="0" cy="0"/>
+          <a:chOff x="0" y="0"/>
+          <a:chExt cx="0" cy="0"/>
+        </a:xfrm>
+      </p:grpSpPr>
+      <p:sp>
+        <p:nvSpPr>
+          <p:cNvPr id="2" name="Slide Image Placeholder 1"/>
+          <p:cNvSpPr>
+            <a:spLocks noGrp="1" noRot="1" noChangeAspect="1"/>
+          </p:cNvSpPr>
+          <p:nvPr>
+            <p:ph type="sldImg"/>
+          </p:nvPr>
+        </p:nvSpPr>
+        <p:spPr/>
+      </p:sp>
+      <p:sp>
+        <p:nvSpPr>
+          <p:cNvPr id="3" name="Notes Placeholder 2"/>
+          <p:cNvSpPr>
+            <a:spLocks noGrp="1"/>
+          </p:cNvSpPr>
+          <p:nvPr>
+            <p:ph type="body" idx="1"/>
+          </p:nvPr>
+        </p:nvSpPr>
+        <p:spPr/>
+        <p:txBody>
+          <a:bodyPr/>
+          <a:lstStyle/>
+          <a:p>
+            <a:endParaRPr lang="en-US"/>
+          </a:p>
+        </p:txBody>
+      </p:sp>
+      <p:sp>
+        <p:nvSpPr>
+          <p:cNvPr id="4" name="Slide Number Placeholder 3"/>
+          <p:cNvSpPr>
+            <a:spLocks noGrp="1"/>
+          </p:cNvSpPr>
+          <p:nvPr>
+            <p:ph type="sldNum" sz="quarter" idx="5"/>
+          </p:nvPr>
+        </p:nvSpPr>
+        <p:spPr/>
+        <p:txBody>
+          <a:bodyPr/>
+          <a:lstStyle/>
+          <a:p>
+            <a:pPr>
+              <a:defRPr/>
+            </a:pPr>
+            <a:fld id="{2D72F1E3-2578-1242-A6A3-72B7E9BB2E1A}" type="slidenum">
+              <a:rPr lang="en-US" smtClean="0"/>
+              <a:pPr>
+                <a:defRPr/>
+              </a:pPr>
+              <a:t>9</a:t>
+            </a:fld>
+            <a:endParaRPr lang="en-US"/>
+          </a:p>
+        </p:txBody>
+      </p:sp>
+    </p:spTree>
+    <p:extLst>
+      <p:ext uri="{BB962C8B-B14F-4D97-AF65-F5344CB8AC3E}">
+        <p14:creationId xmlns:p14="http://schemas.microsoft.com/office/powerpoint/2010/main" val="1996437492"/>
+      </p:ext>
+    </p:extLst>
+  </p:cSld>
+  <p:clrMapOvr>
+    <a:masterClrMapping/>
+  </p:clrMapOvr>
+</p:notes>
+</file>
+
+<file path=ppt/notesSlides/notesSlide7.xml><?xml version="1.0" encoding="utf-8"?>
 <p:notes xmlns:a="http://schemas.openxmlformats.org/drawingml/2006/main" xmlns:r="http://schemas.openxmlformats.org/officeDocument/2006/relationships" xmlns:p="http://schemas.openxmlformats.org/presentationml/2006/main">
   <p:cSld>
     <p:spTree>
@@ -2270,7 +2452,7 @@
               <a:pPr>
                 <a:defRPr/>
               </a:pPr>
-              <a:t>9</a:t>
+              <a:t>10</a:t>
             </a:fld>
             <a:endParaRPr lang="en-US"/>
           </a:p>
@@ -3826,7 +4008,7 @@
               </a14:hiddenEffects>
             </a:ext>
             <a:ext uri="{FAA26D3D-D897-4be2-8F04-BA451C77F1D7}">
-              <ma14:placeholderFlag xmlns="" xmlns:ma14="http://schemas.microsoft.com/office/mac/drawingml/2011/main" val="1"/>
+              <ma14:placeholderFlag xmlns:ma14="http://schemas.microsoft.com/office/mac/drawingml/2011/main" xmlns="" val="1"/>
             </a:ext>
           </a:extLst>
         </p:spPr>
@@ -3900,7 +4082,7 @@
               </a14:hiddenEffects>
             </a:ext>
             <a:ext uri="{FAA26D3D-D897-4be2-8F04-BA451C77F1D7}">
-              <ma14:placeholderFlag xmlns="" xmlns:ma14="http://schemas.microsoft.com/office/mac/drawingml/2011/main" val="1"/>
+              <ma14:placeholderFlag xmlns:ma14="http://schemas.microsoft.com/office/mac/drawingml/2011/main" xmlns="" val="1"/>
             </a:ext>
           </a:extLst>
         </p:spPr>
@@ -4468,6 +4650,63 @@
 </p:sld>
 </file>
 
+<file path=ppt/slides/slide10.xml><?xml version="1.0" encoding="utf-8"?>
+<p:sld xmlns:a="http://schemas.openxmlformats.org/drawingml/2006/main" xmlns:r="http://schemas.openxmlformats.org/officeDocument/2006/relationships" xmlns:p="http://schemas.openxmlformats.org/presentationml/2006/main">
+  <p:cSld>
+    <p:spTree>
+      <p:nvGrpSpPr>
+        <p:cNvPr id="1" name=""/>
+        <p:cNvGrpSpPr/>
+        <p:nvPr/>
+      </p:nvGrpSpPr>
+      <p:grpSpPr>
+        <a:xfrm>
+          <a:off x="0" y="0"/>
+          <a:ext cx="0" cy="0"/>
+          <a:chOff x="0" y="0"/>
+          <a:chExt cx="0" cy="0"/>
+        </a:xfrm>
+      </p:grpSpPr>
+      <p:sp>
+        <p:nvSpPr>
+          <p:cNvPr id="2" name="Title 1"/>
+          <p:cNvSpPr>
+            <a:spLocks noGrp="1"/>
+          </p:cNvSpPr>
+          <p:nvPr>
+            <p:ph type="title"/>
+          </p:nvPr>
+        </p:nvSpPr>
+        <p:spPr>
+          <a:xfrm>
+            <a:off x="304800" y="2186643"/>
+            <a:ext cx="8534400" cy="523220"/>
+          </a:xfrm>
+        </p:spPr>
+        <p:txBody>
+          <a:bodyPr/>
+          <a:lstStyle/>
+          <a:p>
+            <a:r>
+              <a:rPr lang="en-US"/>
+              <a:t>Thank you for your attention!</a:t>
+            </a:r>
+          </a:p>
+        </p:txBody>
+      </p:sp>
+    </p:spTree>
+    <p:extLst>
+      <p:ext uri="{BB962C8B-B14F-4D97-AF65-F5344CB8AC3E}">
+        <p14:creationId xmlns:p14="http://schemas.microsoft.com/office/powerpoint/2010/main" val="2036475844"/>
+      </p:ext>
+    </p:extLst>
+  </p:cSld>
+  <p:clrMapOvr>
+    <a:masterClrMapping/>
+  </p:clrMapOvr>
+</p:sld>
+</file>
+
 <file path=ppt/slides/slide2.xml><?xml version="1.0" encoding="utf-8"?>
 <p:sld xmlns:a="http://schemas.openxmlformats.org/drawingml/2006/main" xmlns:r="http://schemas.openxmlformats.org/officeDocument/2006/relationships" xmlns:p="http://schemas.openxmlformats.org/presentationml/2006/main">
   <p:cSld>
@@ -5044,7 +5283,65 @@
             <a:pPr marL="0" indent="0">
               <a:buNone/>
             </a:pPr>
-            <a:endParaRPr lang="en-GB"/>
+            <a:r>
+              <a:rPr lang="en-GB" dirty="0">
+                <a:solidFill>
+                  <a:srgbClr val="002060"/>
+                </a:solidFill>
+              </a:rPr>
+              <a:t>Ground Truth</a:t>
+            </a:r>
+            <a:r>
+              <a:rPr lang="en-GB" dirty="0"/>
+              <a:t>, </a:t>
+            </a:r>
+            <a:r>
+              <a:rPr lang="en-GB" dirty="0">
+                <a:solidFill>
+                  <a:srgbClr val="00B050"/>
+                </a:solidFill>
+              </a:rPr>
+              <a:t>Prediction</a:t>
+            </a:r>
+            <a:r>
+              <a:rPr lang="en-GB" dirty="0"/>
+              <a:t>, </a:t>
+            </a:r>
+            <a:r>
+              <a:rPr lang="en-GB" dirty="0">
+                <a:solidFill>
+                  <a:schemeClr val="tx2">
+                    <a:lumMod val="40000"/>
+                    <a:lumOff val="60000"/>
+                  </a:schemeClr>
+                </a:solidFill>
+              </a:rPr>
+              <a:t>Crop Area</a:t>
+            </a:r>
+            <a:r>
+              <a:rPr lang="en-GB" dirty="0"/>
+              <a:t>, </a:t>
+            </a:r>
+            <a:r>
+              <a:rPr lang="en-GB" dirty="0">
+                <a:solidFill>
+                  <a:srgbClr val="FF0000"/>
+                </a:solidFill>
+              </a:rPr>
+              <a:t>Anchor Box</a:t>
+            </a:r>
+            <a:r>
+              <a:rPr lang="en-GB" dirty="0"/>
+              <a:t>, </a:t>
+            </a:r>
+            <a:r>
+              <a:rPr lang="en-GB" dirty="0">
+                <a:solidFill>
+                  <a:srgbClr val="E8DD00"/>
+                </a:solidFill>
+              </a:rPr>
+              <a:t>CABB Target</a:t>
+            </a:r>
           </a:p>
         </p:txBody>
       </p:sp>
@@ -5266,36 +5563,26 @@
           <a:lstStyle/>
           <a:p>
             <a:r>
-              <a:rPr lang="en-US"/>
+              <a:rPr lang="en-US" dirty="0"/>
               <a:t>1024*512 Image size, 512*256 Crop size</a:t>
             </a:r>
           </a:p>
           <a:p>
             <a:r>
-              <a:rPr lang="en-US"/>
-              <a:t>8 Image per GPU</a:t>
-            </a:r>
-          </a:p>
-          <a:p>
-            <a:r>
-              <a:rPr lang="en-US"/>
+              <a:rPr lang="en-US" dirty="0"/>
+              <a:t>8 Image per Batch on a single GPU</a:t>
+            </a:r>
+          </a:p>
+          <a:p>
+            <a:r>
+              <a:rPr lang="en-US" dirty="0"/>
               <a:t>100 epochs of training with </a:t>
             </a:r>
             <a:r>
-              <a:rPr lang="en-US">
-                <a:solidFill>
-                  <a:srgbClr val="FF0000"/>
-                </a:solidFill>
-              </a:rPr>
-              <a:t>TODO check </a:t>
-            </a:r>
-            <a:r>
-              <a:rPr lang="en-US" sz="1800" b="0" i="0" u="none" strike="noStrike" baseline="0">
-                <a:latin typeface="NimbusRomNo9L-Regu"/>
-              </a:rPr>
+              <a:rPr lang="en-US" b="0" i="0" u="none" strike="noStrike" baseline="0" dirty="0"/>
               <a:t>2975 training images</a:t>
             </a:r>
-            <a:endParaRPr lang="en-US"/>
+            <a:endParaRPr lang="en-US" dirty="0"/>
           </a:p>
         </p:txBody>
       </p:sp>
@@ -5351,8 +5638,8 @@
           <a:lstStyle/>
           <a:p>
             <a:r>
-              <a:rPr lang="en-US"/>
-              <a:t>Results/Comparison</a:t>
+              <a:rPr lang="en-US" dirty="0"/>
+              <a:t>Training Results</a:t>
             </a:r>
           </a:p>
         </p:txBody>
@@ -5373,36 +5660,83 @@
             <p:ph idx="1"/>
           </p:nvPr>
         </p:nvSpPr>
-        <p:spPr/>
+        <p:spPr>
+          <a:xfrm>
+            <a:off x="381000" y="3234378"/>
+            <a:ext cx="8534400" cy="1623372"/>
+          </a:xfrm>
+        </p:spPr>
         <p:txBody>
           <a:bodyPr/>
           <a:lstStyle/>
           <a:p>
             <a:r>
-              <a:rPr lang="en-US"/>
-              <a:t>Final values</a:t>
-            </a:r>
-          </a:p>
-          <a:p>
-            <a:r>
-              <a:rPr lang="en-US"/>
-              <a:t>Graph with history?</a:t>
-            </a:r>
-          </a:p>
-          <a:p>
-            <a:r>
-              <a:rPr lang="en-US"/>
-              <a:t>Training speed difference(look when episode saves were created)!</a:t>
-            </a:r>
-          </a:p>
-          <a:p>
-            <a:r>
-              <a:rPr lang="en-US"/>
-              <a:t>Difference in final images?</a:t>
+              <a:rPr lang="en-US" dirty="0"/>
+              <a:t>39.5h for baseline vs 20.5h for the baseline</a:t>
             </a:r>
           </a:p>
         </p:txBody>
       </p:sp>
+      <p:pic>
+        <p:nvPicPr>
+          <p:cNvPr id="5" name="Picture 4" descr="Chart, line chart&#10;&#10;Description automatically generated">
+            <a:extLst>
+              <a:ext uri="{FF2B5EF4-FFF2-40B4-BE49-F238E27FC236}">
+                <a16:creationId xmlns:a16="http://schemas.microsoft.com/office/drawing/2014/main" id="{38275DBB-6F88-4CFE-B61C-28C8F930DCE4}"/>
+              </a:ext>
+            </a:extLst>
+          </p:cNvPr>
+          <p:cNvPicPr>
+            <a:picLocks noChangeAspect="1"/>
+          </p:cNvPicPr>
+          <p:nvPr/>
+        </p:nvPicPr>
+        <p:blipFill>
+          <a:blip r:embed="rId3"/>
+          <a:stretch>
+            <a:fillRect/>
+          </a:stretch>
+        </p:blipFill>
+        <p:spPr>
+          <a:xfrm>
+            <a:off x="381000" y="766763"/>
+            <a:ext cx="3290154" cy="2467615"/>
+          </a:xfrm>
+          <a:prstGeom prst="rect">
+            <a:avLst/>
+          </a:prstGeom>
+        </p:spPr>
+      </p:pic>
+      <p:pic>
+        <p:nvPicPr>
+          <p:cNvPr id="7" name="Picture 6" descr="Chart&#10;&#10;Description automatically generated">
+            <a:extLst>
+              <a:ext uri="{FF2B5EF4-FFF2-40B4-BE49-F238E27FC236}">
+                <a16:creationId xmlns:a16="http://schemas.microsoft.com/office/drawing/2014/main" id="{99CD42C8-0441-44C1-AB6E-75402FFBC4FB}"/>
+              </a:ext>
+            </a:extLst>
+          </p:cNvPr>
+          <p:cNvPicPr>
+            <a:picLocks noChangeAspect="1"/>
+          </p:cNvPicPr>
+          <p:nvPr/>
+        </p:nvPicPr>
+        <p:blipFill>
+          <a:blip r:embed="rId4"/>
+          <a:stretch>
+            <a:fillRect/>
+          </a:stretch>
+        </p:blipFill>
+        <p:spPr>
+          <a:xfrm>
+            <a:off x="4334934" y="766763"/>
+            <a:ext cx="3290153" cy="2467614"/>
+          </a:xfrm>
+          <a:prstGeom prst="rect">
+            <a:avLst/>
+          </a:prstGeom>
+        </p:spPr>
+      </p:pic>
     </p:spTree>
     <p:extLst>
       <p:ext uri="{BB962C8B-B14F-4D97-AF65-F5344CB8AC3E}">
@@ -5435,7 +5769,13 @@
       </p:grpSpPr>
       <p:sp>
         <p:nvSpPr>
-          <p:cNvPr id="2" name="Title 1"/>
+          <p:cNvPr id="2" name="Title 1">
+            <a:extLst>
+              <a:ext uri="{FF2B5EF4-FFF2-40B4-BE49-F238E27FC236}">
+                <a16:creationId xmlns:a16="http://schemas.microsoft.com/office/drawing/2014/main" id="{2FCE780E-3FF4-421C-964C-B75E1A39EFF2}"/>
+              </a:ext>
+            </a:extLst>
+          </p:cNvPr>
           <p:cNvSpPr>
             <a:spLocks noGrp="1"/>
           </p:cNvSpPr>
@@ -5443,27 +5783,770 @@
             <p:ph type="title"/>
           </p:nvPr>
         </p:nvSpPr>
-        <p:spPr>
-          <a:xfrm>
-            <a:off x="304800" y="2186643"/>
-            <a:ext cx="8534400" cy="523220"/>
-          </a:xfrm>
-        </p:spPr>
+        <p:spPr/>
         <p:txBody>
           <a:bodyPr/>
           <a:lstStyle/>
           <a:p>
             <a:r>
-              <a:rPr lang="en-US"/>
-              <a:t>Thank you for your attention!</a:t>
+              <a:rPr lang="en-US" dirty="0"/>
+              <a:t>Test Results</a:t>
             </a:r>
           </a:p>
         </p:txBody>
       </p:sp>
+      <p:sp>
+        <p:nvSpPr>
+          <p:cNvPr id="3" name="Content Placeholder 2">
+            <a:extLst>
+              <a:ext uri="{FF2B5EF4-FFF2-40B4-BE49-F238E27FC236}">
+                <a16:creationId xmlns:a16="http://schemas.microsoft.com/office/drawing/2014/main" id="{D3E3E94D-EF3A-4FD9-ADD1-D1042230A624}"/>
+              </a:ext>
+            </a:extLst>
+          </p:cNvPr>
+          <p:cNvSpPr>
+            <a:spLocks noGrp="1"/>
+          </p:cNvSpPr>
+          <p:nvPr>
+            <p:ph idx="1"/>
+          </p:nvPr>
+        </p:nvSpPr>
+        <p:spPr/>
+        <p:txBody>
+          <a:bodyPr/>
+          <a:lstStyle/>
+          <a:p>
+            <a:r>
+              <a:rPr lang="en-GB" b="0" i="0" dirty="0">
+                <a:effectLst/>
+              </a:rPr>
+              <a:t>Test on 500 images</a:t>
+            </a:r>
+          </a:p>
+        </p:txBody>
+      </p:sp>
+      <p:graphicFrame>
+        <p:nvGraphicFramePr>
+          <p:cNvPr id="4" name="Table 4">
+            <a:extLst>
+              <a:ext uri="{FF2B5EF4-FFF2-40B4-BE49-F238E27FC236}">
+                <a16:creationId xmlns:a16="http://schemas.microsoft.com/office/drawing/2014/main" id="{20FEEC53-DE56-42DB-8905-F6057BC6BC0D}"/>
+              </a:ext>
+            </a:extLst>
+          </p:cNvPr>
+          <p:cNvGraphicFramePr>
+            <a:graphicFrameLocks noGrp="1"/>
+          </p:cNvGraphicFramePr>
+          <p:nvPr>
+            <p:extLst>
+              <p:ext uri="{D42A27DB-BD31-4B8C-83A1-F6EECF244321}">
+                <p14:modId xmlns:p14="http://schemas.microsoft.com/office/powerpoint/2010/main" val="2640384179"/>
+              </p:ext>
+            </p:extLst>
+          </p:nvPr>
+        </p:nvGraphicFramePr>
+        <p:xfrm>
+          <a:off x="381000" y="3131913"/>
+          <a:ext cx="6096000" cy="1483360"/>
+        </p:xfrm>
+        <a:graphic>
+          <a:graphicData uri="http://schemas.openxmlformats.org/drawingml/2006/table">
+            <a:tbl>
+              <a:tblPr firstRow="1" bandRow="1">
+                <a:tableStyleId>{073A0DAA-6AF3-43AB-8588-CEC1D06C72B9}</a:tableStyleId>
+              </a:tblPr>
+              <a:tblGrid>
+                <a:gridCol w="1219200">
+                  <a:extLst>
+                    <a:ext uri="{9D8B030D-6E8A-4147-A177-3AD203B41FA5}">
+                      <a16:colId xmlns:a16="http://schemas.microsoft.com/office/drawing/2014/main" val="1684866995"/>
+                    </a:ext>
+                  </a:extLst>
+                </a:gridCol>
+                <a:gridCol w="1219200">
+                  <a:extLst>
+                    <a:ext uri="{9D8B030D-6E8A-4147-A177-3AD203B41FA5}">
+                      <a16:colId xmlns:a16="http://schemas.microsoft.com/office/drawing/2014/main" val="2067841876"/>
+                    </a:ext>
+                  </a:extLst>
+                </a:gridCol>
+                <a:gridCol w="1219200">
+                  <a:extLst>
+                    <a:ext uri="{9D8B030D-6E8A-4147-A177-3AD203B41FA5}">
+                      <a16:colId xmlns:a16="http://schemas.microsoft.com/office/drawing/2014/main" val="1625009658"/>
+                    </a:ext>
+                  </a:extLst>
+                </a:gridCol>
+                <a:gridCol w="1219200">
+                  <a:extLst>
+                    <a:ext uri="{9D8B030D-6E8A-4147-A177-3AD203B41FA5}">
+                      <a16:colId xmlns:a16="http://schemas.microsoft.com/office/drawing/2014/main" val="3473858980"/>
+                    </a:ext>
+                  </a:extLst>
+                </a:gridCol>
+                <a:gridCol w="1219200">
+                  <a:extLst>
+                    <a:ext uri="{9D8B030D-6E8A-4147-A177-3AD203B41FA5}">
+                      <a16:colId xmlns:a16="http://schemas.microsoft.com/office/drawing/2014/main" val="4081848785"/>
+                    </a:ext>
+                  </a:extLst>
+                </a:gridCol>
+              </a:tblGrid>
+              <a:tr h="370840">
+                <a:tc>
+                  <a:txBody>
+                    <a:bodyPr/>
+                    <a:lstStyle/>
+                    <a:p>
+                      <a:r>
+                        <a:rPr lang="en-US" dirty="0"/>
+                        <a:t>CABB</a:t>
+                      </a:r>
+                    </a:p>
+                  </a:txBody>
+                  <a:tcPr/>
+                </a:tc>
+                <a:tc>
+                  <a:txBody>
+                    <a:bodyPr/>
+                    <a:lstStyle/>
+                    <a:p>
+                      <a:r>
+                        <a:rPr lang="en-US" dirty="0"/>
+                        <a:t>PQ</a:t>
+                      </a:r>
+                    </a:p>
+                  </a:txBody>
+                  <a:tcPr/>
+                </a:tc>
+                <a:tc>
+                  <a:txBody>
+                    <a:bodyPr/>
+                    <a:lstStyle/>
+                    <a:p>
+                      <a:r>
+                        <a:rPr lang="en-US" dirty="0"/>
+                        <a:t>SQ</a:t>
+                      </a:r>
+                    </a:p>
+                  </a:txBody>
+                  <a:tcPr/>
+                </a:tc>
+                <a:tc>
+                  <a:txBody>
+                    <a:bodyPr/>
+                    <a:lstStyle/>
+                    <a:p>
+                      <a:r>
+                        <a:rPr lang="en-US" dirty="0"/>
+                        <a:t>RQ</a:t>
+                      </a:r>
+                    </a:p>
+                  </a:txBody>
+                  <a:tcPr/>
+                </a:tc>
+                <a:tc>
+                  <a:txBody>
+                    <a:bodyPr/>
+                    <a:lstStyle/>
+                    <a:p>
+                      <a:r>
+                        <a:rPr lang="en-US" dirty="0"/>
+                        <a:t>N</a:t>
+                      </a:r>
+                    </a:p>
+                  </a:txBody>
+                  <a:tcPr/>
+                </a:tc>
+                <a:extLst>
+                  <a:ext uri="{0D108BD9-81ED-4DB2-BD59-A6C34878D82A}">
+                    <a16:rowId xmlns:a16="http://schemas.microsoft.com/office/drawing/2014/main" val="4165284127"/>
+                  </a:ext>
+                </a:extLst>
+              </a:tr>
+              <a:tr h="370840">
+                <a:tc>
+                  <a:txBody>
+                    <a:bodyPr/>
+                    <a:lstStyle/>
+                    <a:p>
+                      <a:r>
+                        <a:rPr lang="en-US" dirty="0"/>
+                        <a:t>All</a:t>
+                      </a:r>
+                    </a:p>
+                  </a:txBody>
+                  <a:tcPr/>
+                </a:tc>
+                <a:tc>
+                  <a:txBody>
+                    <a:bodyPr/>
+                    <a:lstStyle/>
+                    <a:p>
+                      <a:r>
+                        <a:rPr lang="en-US" dirty="0"/>
+                        <a:t>46.1</a:t>
+                      </a:r>
+                    </a:p>
+                  </a:txBody>
+                  <a:tcPr/>
+                </a:tc>
+                <a:tc>
+                  <a:txBody>
+                    <a:bodyPr/>
+                    <a:lstStyle/>
+                    <a:p>
+                      <a:r>
+                        <a:rPr lang="en-US" dirty="0"/>
+                        <a:t>74.9</a:t>
+                      </a:r>
+                    </a:p>
+                  </a:txBody>
+                  <a:tcPr/>
+                </a:tc>
+                <a:tc>
+                  <a:txBody>
+                    <a:bodyPr/>
+                    <a:lstStyle/>
+                    <a:p>
+                      <a:r>
+                        <a:rPr lang="en-US" dirty="0"/>
+                        <a:t>59.2</a:t>
+                      </a:r>
+                    </a:p>
+                  </a:txBody>
+                  <a:tcPr/>
+                </a:tc>
+                <a:tc>
+                  <a:txBody>
+                    <a:bodyPr/>
+                    <a:lstStyle/>
+                    <a:p>
+                      <a:r>
+                        <a:rPr lang="en-US" dirty="0"/>
+                        <a:t>19</a:t>
+                      </a:r>
+                    </a:p>
+                  </a:txBody>
+                  <a:tcPr/>
+                </a:tc>
+                <a:extLst>
+                  <a:ext uri="{0D108BD9-81ED-4DB2-BD59-A6C34878D82A}">
+                    <a16:rowId xmlns:a16="http://schemas.microsoft.com/office/drawing/2014/main" val="3156846157"/>
+                  </a:ext>
+                </a:extLst>
+              </a:tr>
+              <a:tr h="370840">
+                <a:tc>
+                  <a:txBody>
+                    <a:bodyPr/>
+                    <a:lstStyle/>
+                    <a:p>
+                      <a:r>
+                        <a:rPr lang="en-US" dirty="0"/>
+                        <a:t>Things</a:t>
+                      </a:r>
+                    </a:p>
+                  </a:txBody>
+                  <a:tcPr/>
+                </a:tc>
+                <a:tc>
+                  <a:txBody>
+                    <a:bodyPr/>
+                    <a:lstStyle/>
+                    <a:p>
+                      <a:r>
+                        <a:rPr lang="en-US" dirty="0"/>
+                        <a:t>38.2</a:t>
+                      </a:r>
+                    </a:p>
+                  </a:txBody>
+                  <a:tcPr/>
+                </a:tc>
+                <a:tc>
+                  <a:txBody>
+                    <a:bodyPr/>
+                    <a:lstStyle/>
+                    <a:p>
+                      <a:r>
+                        <a:rPr lang="en-US" dirty="0"/>
+                        <a:t>72.7</a:t>
+                      </a:r>
+                    </a:p>
+                  </a:txBody>
+                  <a:tcPr/>
+                </a:tc>
+                <a:tc>
+                  <a:txBody>
+                    <a:bodyPr/>
+                    <a:lstStyle/>
+                    <a:p>
+                      <a:r>
+                        <a:rPr lang="en-US" dirty="0"/>
+                        <a:t>52.1</a:t>
+                      </a:r>
+                    </a:p>
+                  </a:txBody>
+                  <a:tcPr/>
+                </a:tc>
+                <a:tc>
+                  <a:txBody>
+                    <a:bodyPr/>
+                    <a:lstStyle/>
+                    <a:p>
+                      <a:r>
+                        <a:rPr lang="en-US" dirty="0"/>
+                        <a:t>8</a:t>
+                      </a:r>
+                    </a:p>
+                  </a:txBody>
+                  <a:tcPr/>
+                </a:tc>
+                <a:extLst>
+                  <a:ext uri="{0D108BD9-81ED-4DB2-BD59-A6C34878D82A}">
+                    <a16:rowId xmlns:a16="http://schemas.microsoft.com/office/drawing/2014/main" val="669646875"/>
+                  </a:ext>
+                </a:extLst>
+              </a:tr>
+              <a:tr h="370840">
+                <a:tc>
+                  <a:txBody>
+                    <a:bodyPr/>
+                    <a:lstStyle/>
+                    <a:p>
+                      <a:r>
+                        <a:rPr lang="en-US" dirty="0"/>
+                        <a:t>Stuff</a:t>
+                      </a:r>
+                    </a:p>
+                  </a:txBody>
+                  <a:tcPr/>
+                </a:tc>
+                <a:tc>
+                  <a:txBody>
+                    <a:bodyPr/>
+                    <a:lstStyle/>
+                    <a:p>
+                      <a:r>
+                        <a:rPr lang="en-US" dirty="0"/>
+                        <a:t>51.9</a:t>
+                      </a:r>
+                    </a:p>
+                  </a:txBody>
+                  <a:tcPr/>
+                </a:tc>
+                <a:tc>
+                  <a:txBody>
+                    <a:bodyPr/>
+                    <a:lstStyle/>
+                    <a:p>
+                      <a:r>
+                        <a:rPr lang="en-US" dirty="0"/>
+                        <a:t>76.5</a:t>
+                      </a:r>
+                    </a:p>
+                  </a:txBody>
+                  <a:tcPr/>
+                </a:tc>
+                <a:tc>
+                  <a:txBody>
+                    <a:bodyPr/>
+                    <a:lstStyle/>
+                    <a:p>
+                      <a:r>
+                        <a:rPr lang="en-US" dirty="0"/>
+                        <a:t>64.4</a:t>
+                      </a:r>
+                    </a:p>
+                  </a:txBody>
+                  <a:tcPr/>
+                </a:tc>
+                <a:tc>
+                  <a:txBody>
+                    <a:bodyPr/>
+                    <a:lstStyle/>
+                    <a:p>
+                      <a:r>
+                        <a:rPr lang="en-US" dirty="0"/>
+                        <a:t>11</a:t>
+                      </a:r>
+                    </a:p>
+                  </a:txBody>
+                  <a:tcPr/>
+                </a:tc>
+                <a:extLst>
+                  <a:ext uri="{0D108BD9-81ED-4DB2-BD59-A6C34878D82A}">
+                    <a16:rowId xmlns:a16="http://schemas.microsoft.com/office/drawing/2014/main" val="3198361951"/>
+                  </a:ext>
+                </a:extLst>
+              </a:tr>
+            </a:tbl>
+          </a:graphicData>
+        </a:graphic>
+      </p:graphicFrame>
+      <p:graphicFrame>
+        <p:nvGraphicFramePr>
+          <p:cNvPr id="5" name="Table 4">
+            <a:extLst>
+              <a:ext uri="{FF2B5EF4-FFF2-40B4-BE49-F238E27FC236}">
+                <a16:creationId xmlns:a16="http://schemas.microsoft.com/office/drawing/2014/main" id="{3D061807-5988-4D6D-8313-9213B56228B6}"/>
+              </a:ext>
+            </a:extLst>
+          </p:cNvPr>
+          <p:cNvGraphicFramePr>
+            <a:graphicFrameLocks noGrp="1"/>
+          </p:cNvGraphicFramePr>
+          <p:nvPr>
+            <p:extLst>
+              <p:ext uri="{D42A27DB-BD31-4B8C-83A1-F6EECF244321}">
+                <p14:modId xmlns:p14="http://schemas.microsoft.com/office/powerpoint/2010/main" val="517737343"/>
+              </p:ext>
+            </p:extLst>
+          </p:nvPr>
+        </p:nvGraphicFramePr>
+        <p:xfrm>
+          <a:off x="381000" y="1402715"/>
+          <a:ext cx="6096000" cy="1483360"/>
+        </p:xfrm>
+        <a:graphic>
+          <a:graphicData uri="http://schemas.openxmlformats.org/drawingml/2006/table">
+            <a:tbl>
+              <a:tblPr firstRow="1" bandRow="1">
+                <a:tableStyleId>{073A0DAA-6AF3-43AB-8588-CEC1D06C72B9}</a:tableStyleId>
+              </a:tblPr>
+              <a:tblGrid>
+                <a:gridCol w="1219200">
+                  <a:extLst>
+                    <a:ext uri="{9D8B030D-6E8A-4147-A177-3AD203B41FA5}">
+                      <a16:colId xmlns:a16="http://schemas.microsoft.com/office/drawing/2014/main" val="226888260"/>
+                    </a:ext>
+                  </a:extLst>
+                </a:gridCol>
+                <a:gridCol w="1219200">
+                  <a:extLst>
+                    <a:ext uri="{9D8B030D-6E8A-4147-A177-3AD203B41FA5}">
+                      <a16:colId xmlns:a16="http://schemas.microsoft.com/office/drawing/2014/main" val="1184917158"/>
+                    </a:ext>
+                  </a:extLst>
+                </a:gridCol>
+                <a:gridCol w="1219200">
+                  <a:extLst>
+                    <a:ext uri="{9D8B030D-6E8A-4147-A177-3AD203B41FA5}">
+                      <a16:colId xmlns:a16="http://schemas.microsoft.com/office/drawing/2014/main" val="1517788863"/>
+                    </a:ext>
+                  </a:extLst>
+                </a:gridCol>
+                <a:gridCol w="1219200">
+                  <a:extLst>
+                    <a:ext uri="{9D8B030D-6E8A-4147-A177-3AD203B41FA5}">
+                      <a16:colId xmlns:a16="http://schemas.microsoft.com/office/drawing/2014/main" val="4192114258"/>
+                    </a:ext>
+                  </a:extLst>
+                </a:gridCol>
+                <a:gridCol w="1219200">
+                  <a:extLst>
+                    <a:ext uri="{9D8B030D-6E8A-4147-A177-3AD203B41FA5}">
+                      <a16:colId xmlns:a16="http://schemas.microsoft.com/office/drawing/2014/main" val="1311030990"/>
+                    </a:ext>
+                  </a:extLst>
+                </a:gridCol>
+              </a:tblGrid>
+              <a:tr h="370840">
+                <a:tc>
+                  <a:txBody>
+                    <a:bodyPr/>
+                    <a:lstStyle/>
+                    <a:p>
+                      <a:r>
+                        <a:rPr lang="en-US" dirty="0"/>
+                        <a:t>Base</a:t>
+                      </a:r>
+                    </a:p>
+                  </a:txBody>
+                  <a:tcPr/>
+                </a:tc>
+                <a:tc>
+                  <a:txBody>
+                    <a:bodyPr/>
+                    <a:lstStyle/>
+                    <a:p>
+                      <a:r>
+                        <a:rPr lang="en-US" dirty="0"/>
+                        <a:t>PQ</a:t>
+                      </a:r>
+                    </a:p>
+                  </a:txBody>
+                  <a:tcPr/>
+                </a:tc>
+                <a:tc>
+                  <a:txBody>
+                    <a:bodyPr/>
+                    <a:lstStyle/>
+                    <a:p>
+                      <a:r>
+                        <a:rPr lang="en-US" dirty="0"/>
+                        <a:t>SQ</a:t>
+                      </a:r>
+                    </a:p>
+                  </a:txBody>
+                  <a:tcPr/>
+                </a:tc>
+                <a:tc>
+                  <a:txBody>
+                    <a:bodyPr/>
+                    <a:lstStyle/>
+                    <a:p>
+                      <a:r>
+                        <a:rPr lang="en-US" dirty="0"/>
+                        <a:t>RQ</a:t>
+                      </a:r>
+                    </a:p>
+                  </a:txBody>
+                  <a:tcPr/>
+                </a:tc>
+                <a:tc>
+                  <a:txBody>
+                    <a:bodyPr/>
+                    <a:lstStyle/>
+                    <a:p>
+                      <a:r>
+                        <a:rPr lang="en-US" dirty="0"/>
+                        <a:t>N</a:t>
+                      </a:r>
+                    </a:p>
+                  </a:txBody>
+                  <a:tcPr/>
+                </a:tc>
+                <a:extLst>
+                  <a:ext uri="{0D108BD9-81ED-4DB2-BD59-A6C34878D82A}">
+                    <a16:rowId xmlns:a16="http://schemas.microsoft.com/office/drawing/2014/main" val="2845265572"/>
+                  </a:ext>
+                </a:extLst>
+              </a:tr>
+              <a:tr h="370840">
+                <a:tc>
+                  <a:txBody>
+                    <a:bodyPr/>
+                    <a:lstStyle/>
+                    <a:p>
+                      <a:r>
+                        <a:rPr lang="en-US" dirty="0"/>
+                        <a:t>All</a:t>
+                      </a:r>
+                    </a:p>
+                  </a:txBody>
+                  <a:tcPr/>
+                </a:tc>
+                <a:tc>
+                  <a:txBody>
+                    <a:bodyPr/>
+                    <a:lstStyle/>
+                    <a:p>
+                      <a:r>
+                        <a:rPr lang="en-US" dirty="0"/>
+                        <a:t>47.6</a:t>
+                      </a:r>
+                    </a:p>
+                  </a:txBody>
+                  <a:tcPr/>
+                </a:tc>
+                <a:tc>
+                  <a:txBody>
+                    <a:bodyPr/>
+                    <a:lstStyle/>
+                    <a:p>
+                      <a:r>
+                        <a:rPr lang="en-US" dirty="0"/>
+                        <a:t>75.5</a:t>
+                      </a:r>
+                    </a:p>
+                  </a:txBody>
+                  <a:tcPr/>
+                </a:tc>
+                <a:tc>
+                  <a:txBody>
+                    <a:bodyPr/>
+                    <a:lstStyle/>
+                    <a:p>
+                      <a:r>
+                        <a:rPr lang="en-US" dirty="0"/>
+                        <a:t>60.9</a:t>
+                      </a:r>
+                    </a:p>
+                  </a:txBody>
+                  <a:tcPr/>
+                </a:tc>
+                <a:tc>
+                  <a:txBody>
+                    <a:bodyPr/>
+                    <a:lstStyle/>
+                    <a:p>
+                      <a:r>
+                        <a:rPr lang="en-US" dirty="0"/>
+                        <a:t>19</a:t>
+                      </a:r>
+                    </a:p>
+                  </a:txBody>
+                  <a:tcPr/>
+                </a:tc>
+                <a:extLst>
+                  <a:ext uri="{0D108BD9-81ED-4DB2-BD59-A6C34878D82A}">
+                    <a16:rowId xmlns:a16="http://schemas.microsoft.com/office/drawing/2014/main" val="1663649541"/>
+                  </a:ext>
+                </a:extLst>
+              </a:tr>
+              <a:tr h="370840">
+                <a:tc>
+                  <a:txBody>
+                    <a:bodyPr/>
+                    <a:lstStyle/>
+                    <a:p>
+                      <a:r>
+                        <a:rPr lang="en-US" dirty="0"/>
+                        <a:t>Things</a:t>
+                      </a:r>
+                    </a:p>
+                  </a:txBody>
+                  <a:tcPr/>
+                </a:tc>
+                <a:tc>
+                  <a:txBody>
+                    <a:bodyPr/>
+                    <a:lstStyle/>
+                    <a:p>
+                      <a:r>
+                        <a:rPr lang="en-US" dirty="0"/>
+                        <a:t>42.0</a:t>
+                      </a:r>
+                    </a:p>
+                  </a:txBody>
+                  <a:tcPr/>
+                </a:tc>
+                <a:tc>
+                  <a:txBody>
+                    <a:bodyPr/>
+                    <a:lstStyle/>
+                    <a:p>
+                      <a:r>
+                        <a:rPr lang="en-US" dirty="0"/>
+                        <a:t>75.1</a:t>
+                      </a:r>
+                    </a:p>
+                  </a:txBody>
+                  <a:tcPr/>
+                </a:tc>
+                <a:tc>
+                  <a:txBody>
+                    <a:bodyPr/>
+                    <a:lstStyle/>
+                    <a:p>
+                      <a:r>
+                        <a:rPr lang="en-US" dirty="0"/>
+                        <a:t>55.8</a:t>
+                      </a:r>
+                    </a:p>
+                  </a:txBody>
+                  <a:tcPr/>
+                </a:tc>
+                <a:tc>
+                  <a:txBody>
+                    <a:bodyPr/>
+                    <a:lstStyle/>
+                    <a:p>
+                      <a:r>
+                        <a:rPr lang="en-US" dirty="0"/>
+                        <a:t>8</a:t>
+                      </a:r>
+                    </a:p>
+                  </a:txBody>
+                  <a:tcPr/>
+                </a:tc>
+                <a:extLst>
+                  <a:ext uri="{0D108BD9-81ED-4DB2-BD59-A6C34878D82A}">
+                    <a16:rowId xmlns:a16="http://schemas.microsoft.com/office/drawing/2014/main" val="1431258004"/>
+                  </a:ext>
+                </a:extLst>
+              </a:tr>
+              <a:tr h="370840">
+                <a:tc>
+                  <a:txBody>
+                    <a:bodyPr/>
+                    <a:lstStyle/>
+                    <a:p>
+                      <a:r>
+                        <a:rPr lang="en-US" dirty="0"/>
+                        <a:t>Stuff</a:t>
+                      </a:r>
+                    </a:p>
+                  </a:txBody>
+                  <a:tcPr/>
+                </a:tc>
+                <a:tc>
+                  <a:txBody>
+                    <a:bodyPr/>
+                    <a:lstStyle/>
+                    <a:p>
+                      <a:r>
+                        <a:rPr lang="en-US" dirty="0"/>
+                        <a:t>51.7</a:t>
+                      </a:r>
+                    </a:p>
+                  </a:txBody>
+                  <a:tcPr/>
+                </a:tc>
+                <a:tc>
+                  <a:txBody>
+                    <a:bodyPr/>
+                    <a:lstStyle/>
+                    <a:p>
+                      <a:r>
+                        <a:rPr lang="en-US" dirty="0"/>
+                        <a:t>75.8</a:t>
+                      </a:r>
+                    </a:p>
+                  </a:txBody>
+                  <a:tcPr/>
+                </a:tc>
+                <a:tc>
+                  <a:txBody>
+                    <a:bodyPr/>
+                    <a:lstStyle/>
+                    <a:p>
+                      <a:r>
+                        <a:rPr lang="en-US" dirty="0"/>
+                        <a:t>64.5</a:t>
+                      </a:r>
+                    </a:p>
+                  </a:txBody>
+                  <a:tcPr/>
+                </a:tc>
+                <a:tc>
+                  <a:txBody>
+                    <a:bodyPr/>
+                    <a:lstStyle/>
+                    <a:p>
+                      <a:r>
+                        <a:rPr lang="en-US" dirty="0"/>
+                        <a:t>11</a:t>
+                      </a:r>
+                    </a:p>
+                  </a:txBody>
+                  <a:tcPr/>
+                </a:tc>
+                <a:extLst>
+                  <a:ext uri="{0D108BD9-81ED-4DB2-BD59-A6C34878D82A}">
+                    <a16:rowId xmlns:a16="http://schemas.microsoft.com/office/drawing/2014/main" val="4178107573"/>
+                  </a:ext>
+                </a:extLst>
+              </a:tr>
+            </a:tbl>
+          </a:graphicData>
+        </a:graphic>
+      </p:graphicFrame>
     </p:spTree>
     <p:extLst>
       <p:ext uri="{BB962C8B-B14F-4D97-AF65-F5344CB8AC3E}">
-        <p14:creationId xmlns:p14="http://schemas.microsoft.com/office/powerpoint/2010/main" val="2036475844"/>
+        <p14:creationId xmlns:p14="http://schemas.microsoft.com/office/powerpoint/2010/main" val="2484015150"/>
       </p:ext>
     </p:extLst>
   </p:cSld>

</xml_diff>

<commit_message>
Adapted presentation to some of Rohits tips (Plot updates still needed)
</commit_message>
<xml_diff>
--- a/Crop-Aware Panoptic Segmentation.pptx
+++ b/Crop-Aware Panoptic Segmentation.pptx
@@ -5,10 +5,10 @@
     <p:sldMasterId id="2147483653" r:id="rId1"/>
   </p:sldMasterIdLst>
   <p:notesMasterIdLst>
-    <p:notesMasterId r:id="rId15"/>
+    <p:notesMasterId r:id="rId17"/>
   </p:notesMasterIdLst>
   <p:handoutMasterIdLst>
-    <p:handoutMasterId r:id="rId16"/>
+    <p:handoutMasterId r:id="rId18"/>
   </p:handoutMasterIdLst>
   <p:sldIdLst>
     <p:sldId id="607" r:id="rId2"/>
@@ -19,16 +19,18 @@
     <p:sldId id="618" r:id="rId7"/>
     <p:sldId id="613" r:id="rId8"/>
     <p:sldId id="614" r:id="rId9"/>
-    <p:sldId id="617" r:id="rId10"/>
-    <p:sldId id="615" r:id="rId11"/>
-    <p:sldId id="619" r:id="rId12"/>
-    <p:sldId id="622" r:id="rId13"/>
-    <p:sldId id="604" r:id="rId14"/>
+    <p:sldId id="625" r:id="rId10"/>
+    <p:sldId id="617" r:id="rId11"/>
+    <p:sldId id="615" r:id="rId12"/>
+    <p:sldId id="619" r:id="rId13"/>
+    <p:sldId id="624" r:id="rId14"/>
+    <p:sldId id="622" r:id="rId15"/>
+    <p:sldId id="604" r:id="rId16"/>
   </p:sldIdLst>
   <p:sldSz cx="9144000" cy="5143500" type="screen16x9"/>
   <p:notesSz cx="10234613" cy="7099300"/>
   <p:custDataLst>
-    <p:tags r:id="rId17"/>
+    <p:tags r:id="rId19"/>
   </p:custDataLst>
   <p:defaultTextStyle>
     <a:defPPr>
@@ -201,7 +203,7 @@
   <pc:docChgLst>
     <pc:chgData name="Yannick Vogt" userId="860741af1eec8ecc" providerId="LiveId" clId="{2CD5F5D6-88A3-4631-A66A-40A03704DD16}"/>
     <pc:docChg chg="undo custSel addSld delSld modSld sldOrd modMainMaster">
-      <pc:chgData name="Yannick Vogt" userId="860741af1eec8ecc" providerId="LiveId" clId="{2CD5F5D6-88A3-4631-A66A-40A03704DD16}" dt="2021-07-27T11:18:55.687" v="2178" actId="20577"/>
+      <pc:chgData name="Yannick Vogt" userId="860741af1eec8ecc" providerId="LiveId" clId="{2CD5F5D6-88A3-4631-A66A-40A03704DD16}" dt="2021-07-29T08:29:32.828" v="2456"/>
       <pc:docMkLst>
         <pc:docMk/>
       </pc:docMkLst>
@@ -455,13 +457,13 @@
         </pc:picChg>
       </pc:sldChg>
       <pc:sldChg chg="modSp mod">
-        <pc:chgData name="Yannick Vogt" userId="860741af1eec8ecc" providerId="LiveId" clId="{2CD5F5D6-88A3-4631-A66A-40A03704DD16}" dt="2021-07-26T10:33:41.305" v="994" actId="255"/>
+        <pc:chgData name="Yannick Vogt" userId="860741af1eec8ecc" providerId="LiveId" clId="{2CD5F5D6-88A3-4631-A66A-40A03704DD16}" dt="2021-07-29T08:29:26.152" v="2447" actId="6549"/>
         <pc:sldMkLst>
           <pc:docMk/>
           <pc:sldMk cId="2836184599" sldId="617"/>
         </pc:sldMkLst>
         <pc:spChg chg="mod">
-          <ac:chgData name="Yannick Vogt" userId="860741af1eec8ecc" providerId="LiveId" clId="{2CD5F5D6-88A3-4631-A66A-40A03704DD16}" dt="2021-07-26T10:33:41.305" v="994" actId="255"/>
+          <ac:chgData name="Yannick Vogt" userId="860741af1eec8ecc" providerId="LiveId" clId="{2CD5F5D6-88A3-4631-A66A-40A03704DD16}" dt="2021-07-29T08:29:26.152" v="2447" actId="6549"/>
           <ac:spMkLst>
             <pc:docMk/>
             <pc:sldMk cId="2836184599" sldId="617"/>
@@ -493,13 +495,13 @@
         </pc:picChg>
       </pc:sldChg>
       <pc:sldChg chg="addSp modSp new mod modNotesTx">
-        <pc:chgData name="Yannick Vogt" userId="860741af1eec8ecc" providerId="LiveId" clId="{2CD5F5D6-88A3-4631-A66A-40A03704DD16}" dt="2021-07-27T11:01:37.481" v="2158" actId="20577"/>
+        <pc:chgData name="Yannick Vogt" userId="860741af1eec8ecc" providerId="LiveId" clId="{2CD5F5D6-88A3-4631-A66A-40A03704DD16}" dt="2021-07-29T08:23:43.886" v="2250" actId="1076"/>
         <pc:sldMkLst>
           <pc:docMk/>
           <pc:sldMk cId="2484015150" sldId="619"/>
         </pc:sldMkLst>
         <pc:spChg chg="mod">
-          <ac:chgData name="Yannick Vogt" userId="860741af1eec8ecc" providerId="LiveId" clId="{2CD5F5D6-88A3-4631-A66A-40A03704DD16}" dt="2021-07-26T09:57:33.009" v="916" actId="20577"/>
+          <ac:chgData name="Yannick Vogt" userId="860741af1eec8ecc" providerId="LiveId" clId="{2CD5F5D6-88A3-4631-A66A-40A03704DD16}" dt="2021-07-29T08:23:23.080" v="2240" actId="20577"/>
           <ac:spMkLst>
             <pc:docMk/>
             <pc:sldMk cId="2484015150" sldId="619"/>
@@ -507,7 +509,7 @@
           </ac:spMkLst>
         </pc:spChg>
         <pc:spChg chg="mod">
-          <ac:chgData name="Yannick Vogt" userId="860741af1eec8ecc" providerId="LiveId" clId="{2CD5F5D6-88A3-4631-A66A-40A03704DD16}" dt="2021-07-27T11:01:21.081" v="2157" actId="20577"/>
+          <ac:chgData name="Yannick Vogt" userId="860741af1eec8ecc" providerId="LiveId" clId="{2CD5F5D6-88A3-4631-A66A-40A03704DD16}" dt="2021-07-29T08:23:31.172" v="2248" actId="20577"/>
           <ac:spMkLst>
             <pc:docMk/>
             <pc:sldMk cId="2484015150" sldId="619"/>
@@ -515,7 +517,7 @@
           </ac:spMkLst>
         </pc:spChg>
         <pc:graphicFrameChg chg="add mod modGraphic">
-          <ac:chgData name="Yannick Vogt" userId="860741af1eec8ecc" providerId="LiveId" clId="{2CD5F5D6-88A3-4631-A66A-40A03704DD16}" dt="2021-07-26T13:50:58.611" v="1401" actId="1076"/>
+          <ac:chgData name="Yannick Vogt" userId="860741af1eec8ecc" providerId="LiveId" clId="{2CD5F5D6-88A3-4631-A66A-40A03704DD16}" dt="2021-07-29T08:23:39.881" v="2249" actId="1076"/>
           <ac:graphicFrameMkLst>
             <pc:docMk/>
             <pc:sldMk cId="2484015150" sldId="619"/>
@@ -523,7 +525,7 @@
           </ac:graphicFrameMkLst>
         </pc:graphicFrameChg>
         <pc:graphicFrameChg chg="add mod modGraphic">
-          <ac:chgData name="Yannick Vogt" userId="860741af1eec8ecc" providerId="LiveId" clId="{2CD5F5D6-88A3-4631-A66A-40A03704DD16}" dt="2021-07-26T13:50:54.799" v="1400" actId="1076"/>
+          <ac:chgData name="Yannick Vogt" userId="860741af1eec8ecc" providerId="LiveId" clId="{2CD5F5D6-88A3-4631-A66A-40A03704DD16}" dt="2021-07-29T08:23:43.886" v="2250" actId="1076"/>
           <ac:graphicFrameMkLst>
             <pc:docMk/>
             <pc:sldMk cId="2484015150" sldId="619"/>
@@ -625,13 +627,13 @@
         </pc:spChg>
       </pc:sldChg>
       <pc:sldChg chg="addSp delSp modSp new mod">
-        <pc:chgData name="Yannick Vogt" userId="860741af1eec8ecc" providerId="LiveId" clId="{2CD5F5D6-88A3-4631-A66A-40A03704DD16}" dt="2021-07-27T10:55:12.088" v="2066" actId="20577"/>
+        <pc:chgData name="Yannick Vogt" userId="860741af1eec8ecc" providerId="LiveId" clId="{2CD5F5D6-88A3-4631-A66A-40A03704DD16}" dt="2021-07-29T08:23:00.495" v="2215" actId="20577"/>
         <pc:sldMkLst>
           <pc:docMk/>
           <pc:sldMk cId="1681506860" sldId="622"/>
         </pc:sldMkLst>
         <pc:spChg chg="mod">
-          <ac:chgData name="Yannick Vogt" userId="860741af1eec8ecc" providerId="LiveId" clId="{2CD5F5D6-88A3-4631-A66A-40A03704DD16}" dt="2021-07-27T10:46:59.888" v="2009" actId="20577"/>
+          <ac:chgData name="Yannick Vogt" userId="860741af1eec8ecc" providerId="LiveId" clId="{2CD5F5D6-88A3-4631-A66A-40A03704DD16}" dt="2021-07-29T08:23:00.495" v="2215" actId="20577"/>
           <ac:spMkLst>
             <pc:docMk/>
             <pc:sldMk cId="1681506860" sldId="622"/>
@@ -716,6 +718,59 @@
             <ac:picMk id="5" creationId="{8C29D1E0-87E2-4351-824A-27D4DCFAABF2}"/>
           </ac:picMkLst>
         </pc:picChg>
+      </pc:sldChg>
+      <pc:sldChg chg="modSp new mod">
+        <pc:chgData name="Yannick Vogt" userId="860741af1eec8ecc" providerId="LiveId" clId="{2CD5F5D6-88A3-4631-A66A-40A03704DD16}" dt="2021-07-29T08:23:11.054" v="2230" actId="20577"/>
+        <pc:sldMkLst>
+          <pc:docMk/>
+          <pc:sldMk cId="3101039968" sldId="624"/>
+        </pc:sldMkLst>
+        <pc:spChg chg="mod">
+          <ac:chgData name="Yannick Vogt" userId="860741af1eec8ecc" providerId="LiveId" clId="{2CD5F5D6-88A3-4631-A66A-40A03704DD16}" dt="2021-07-29T08:23:11.054" v="2230" actId="20577"/>
+          <ac:spMkLst>
+            <pc:docMk/>
+            <pc:sldMk cId="3101039968" sldId="624"/>
+            <ac:spMk id="2" creationId="{1301A668-9C9B-4CFB-B248-4E04422B723A}"/>
+          </ac:spMkLst>
+        </pc:spChg>
+      </pc:sldChg>
+      <pc:sldChg chg="modSp new del mod">
+        <pc:chgData name="Yannick Vogt" userId="860741af1eec8ecc" providerId="LiveId" clId="{2CD5F5D6-88A3-4631-A66A-40A03704DD16}" dt="2021-07-29T08:29:18.931" v="2441" actId="680"/>
+        <pc:sldMkLst>
+          <pc:docMk/>
+          <pc:sldMk cId="252676587" sldId="625"/>
+        </pc:sldMkLst>
+        <pc:spChg chg="mod">
+          <ac:chgData name="Yannick Vogt" userId="860741af1eec8ecc" providerId="LiveId" clId="{2CD5F5D6-88A3-4631-A66A-40A03704DD16}" dt="2021-07-29T08:29:18.476" v="2440" actId="20577"/>
+          <ac:spMkLst>
+            <pc:docMk/>
+            <pc:sldMk cId="252676587" sldId="625"/>
+            <ac:spMk id="2" creationId="{00B93E99-FFD9-4390-A993-A01EF72CED93}"/>
+          </ac:spMkLst>
+        </pc:spChg>
+      </pc:sldChg>
+      <pc:sldChg chg="modSp new mod">
+        <pc:chgData name="Yannick Vogt" userId="860741af1eec8ecc" providerId="LiveId" clId="{2CD5F5D6-88A3-4631-A66A-40A03704DD16}" dt="2021-07-29T08:29:32.828" v="2456"/>
+        <pc:sldMkLst>
+          <pc:docMk/>
+          <pc:sldMk cId="1654048308" sldId="625"/>
+        </pc:sldMkLst>
+        <pc:spChg chg="mod">
+          <ac:chgData name="Yannick Vogt" userId="860741af1eec8ecc" providerId="LiveId" clId="{2CD5F5D6-88A3-4631-A66A-40A03704DD16}" dt="2021-07-29T08:29:31.695" v="2455" actId="20577"/>
+          <ac:spMkLst>
+            <pc:docMk/>
+            <pc:sldMk cId="1654048308" sldId="625"/>
+            <ac:spMk id="2" creationId="{CDD681D0-9648-4448-8027-24F11F18DF8C}"/>
+          </ac:spMkLst>
+        </pc:spChg>
+        <pc:spChg chg="mod">
+          <ac:chgData name="Yannick Vogt" userId="860741af1eec8ecc" providerId="LiveId" clId="{2CD5F5D6-88A3-4631-A66A-40A03704DD16}" dt="2021-07-29T08:29:32.828" v="2456"/>
+          <ac:spMkLst>
+            <pc:docMk/>
+            <pc:sldMk cId="1654048308" sldId="625"/>
+            <ac:spMk id="3" creationId="{32B4301B-1D8A-4760-8D63-E70381AAD5D9}"/>
+          </ac:spMkLst>
+        </pc:spChg>
       </pc:sldChg>
       <pc:sldMasterChg chg="modSldLayout">
         <pc:chgData name="Yannick Vogt" userId="860741af1eec8ecc" providerId="LiveId" clId="{2CD5F5D6-88A3-4631-A66A-40A03704DD16}" dt="2021-07-23T08:06:29.750" v="0" actId="478"/>
@@ -1153,7 +1208,7 @@
           <a:p>
             <a:fld id="{4E9DBEC1-03D6-8C41-96E3-520E1D7FD629}" type="datetimeFigureOut">
               <a:rPr lang="en-US" smtClean="0"/>
-              <a:t>7/27/2021</a:t>
+              <a:t>7/29/2021</a:t>
             </a:fld>
             <a:endParaRPr lang="en-US"/>
           </a:p>
@@ -2052,7 +2107,7 @@
             <a:pPr marL="0" indent="0">
               <a:buNone/>
             </a:pPr>
-            <a:endParaRPr lang="en-US" dirty="0"/>
+            <a:endParaRPr lang="en-US"/>
           </a:p>
         </p:txBody>
       </p:sp>
@@ -2143,18 +2198,18 @@
           <a:lstStyle/>
           <a:p>
             <a:r>
-              <a:rPr lang="en-US" dirty="0"/>
+              <a:rPr lang="en-US"/>
               <a:t>Explain cases</a:t>
             </a:r>
           </a:p>
           <a:p>
             <a:r>
-              <a:rPr lang="en-US" dirty="0"/>
+              <a:rPr lang="en-US"/>
               <a:t>only outside can be modified</a:t>
             </a:r>
           </a:p>
           <a:p>
-            <a:endParaRPr lang="en-US" dirty="0"/>
+            <a:endParaRPr lang="en-US"/>
           </a:p>
         </p:txBody>
       </p:sp>
@@ -2489,7 +2544,7 @@
           <a:bodyPr/>
           <a:lstStyle/>
           <a:p>
-            <a:endParaRPr lang="en-US" dirty="0"/>
+            <a:endParaRPr lang="en-US"/>
           </a:p>
         </p:txBody>
       </p:sp>
@@ -2516,7 +2571,7 @@
               <a:pPr>
                 <a:defRPr/>
               </a:pPr>
-              <a:t>10</a:t>
+              <a:t>11</a:t>
             </a:fld>
             <a:endParaRPr lang="en-US"/>
           </a:p>
@@ -2606,7 +2661,7 @@
               <a:pPr>
                 <a:defRPr/>
               </a:pPr>
-              <a:t>11</a:t>
+              <a:t>12</a:t>
             </a:fld>
             <a:endParaRPr lang="en-US"/>
           </a:p>
@@ -2701,7 +2756,7 @@
               <a:pPr>
                 <a:defRPr/>
               </a:pPr>
-              <a:t>13</a:t>
+              <a:t>15</a:t>
             </a:fld>
             <a:endParaRPr lang="en-US"/>
           </a:p>
@@ -4918,6 +4973,114 @@
       </p:grpSpPr>
       <p:sp>
         <p:nvSpPr>
+          <p:cNvPr id="2" name="Titel 1">
+            <a:extLst>
+              <a:ext uri="{FF2B5EF4-FFF2-40B4-BE49-F238E27FC236}">
+                <a16:creationId xmlns:a16="http://schemas.microsoft.com/office/drawing/2014/main" id="{2DE899C9-ECB8-4209-B44A-D55809197041}"/>
+              </a:ext>
+            </a:extLst>
+          </p:cNvPr>
+          <p:cNvSpPr>
+            <a:spLocks noGrp="1"/>
+          </p:cNvSpPr>
+          <p:nvPr>
+            <p:ph type="title"/>
+          </p:nvPr>
+        </p:nvSpPr>
+        <p:spPr/>
+        <p:txBody>
+          <a:bodyPr/>
+          <a:lstStyle/>
+          <a:p>
+            <a:r>
+              <a:rPr lang="en-US"/>
+              <a:t>Training Setting</a:t>
+            </a:r>
+          </a:p>
+        </p:txBody>
+      </p:sp>
+      <p:sp>
+        <p:nvSpPr>
+          <p:cNvPr id="3" name="Inhaltsplatzhalter 2">
+            <a:extLst>
+              <a:ext uri="{FF2B5EF4-FFF2-40B4-BE49-F238E27FC236}">
+                <a16:creationId xmlns:a16="http://schemas.microsoft.com/office/drawing/2014/main" id="{855BEFD4-C452-40AA-8020-77316D8CF61E}"/>
+              </a:ext>
+            </a:extLst>
+          </p:cNvPr>
+          <p:cNvSpPr>
+            <a:spLocks noGrp="1"/>
+          </p:cNvSpPr>
+          <p:nvPr>
+            <p:ph idx="1"/>
+          </p:nvPr>
+        </p:nvSpPr>
+        <p:spPr/>
+        <p:txBody>
+          <a:bodyPr/>
+          <a:lstStyle/>
+          <a:p>
+            <a:r>
+              <a:rPr lang="en-US" dirty="0"/>
+              <a:t>1024*512 Image size, 512*256 Crop size</a:t>
+            </a:r>
+          </a:p>
+          <a:p>
+            <a:r>
+              <a:rPr lang="en-US" dirty="0"/>
+              <a:t>100 epochs of training with </a:t>
+            </a:r>
+            <a:r>
+              <a:rPr lang="en-US" b="0" i="0" u="none" strike="noStrike" baseline="0" dirty="0"/>
+              <a:t>2975 training images</a:t>
+            </a:r>
+          </a:p>
+          <a:p>
+            <a:r>
+              <a:rPr lang="en-US" dirty="0"/>
+              <a:t>8 Image per Batch on a single GPU</a:t>
+            </a:r>
+          </a:p>
+          <a:p>
+            <a:r>
+              <a:rPr lang="en-US" dirty="0"/>
+              <a:t>~37.200 iterations</a:t>
+            </a:r>
+          </a:p>
+        </p:txBody>
+      </p:sp>
+    </p:spTree>
+    <p:extLst>
+      <p:ext uri="{BB962C8B-B14F-4D97-AF65-F5344CB8AC3E}">
+        <p14:creationId xmlns:p14="http://schemas.microsoft.com/office/powerpoint/2010/main" val="2836184599"/>
+      </p:ext>
+    </p:extLst>
+  </p:cSld>
+  <p:clrMapOvr>
+    <a:masterClrMapping/>
+  </p:clrMapOvr>
+</p:sld>
+</file>
+
+<file path=ppt/slides/slide11.xml><?xml version="1.0" encoding="utf-8"?>
+<p:sld xmlns:a="http://schemas.openxmlformats.org/drawingml/2006/main" xmlns:r="http://schemas.openxmlformats.org/officeDocument/2006/relationships" xmlns:p="http://schemas.openxmlformats.org/presentationml/2006/main">
+  <p:cSld>
+    <p:spTree>
+      <p:nvGrpSpPr>
+        <p:cNvPr id="1" name=""/>
+        <p:cNvGrpSpPr/>
+        <p:nvPr/>
+      </p:nvGrpSpPr>
+      <p:grpSpPr>
+        <a:xfrm>
+          <a:off x="0" y="0"/>
+          <a:ext cx="0" cy="0"/>
+          <a:chOff x="0" y="0"/>
+          <a:chExt cx="0" cy="0"/>
+        </a:xfrm>
+      </p:grpSpPr>
+      <p:sp>
+        <p:nvSpPr>
           <p:cNvPr id="2" name="Title 1">
             <a:extLst>
               <a:ext uri="{FF2B5EF4-FFF2-40B4-BE49-F238E27FC236}">
@@ -5050,7 +5213,7 @@
 </p:sld>
 </file>
 
-<file path=ppt/slides/slide11.xml><?xml version="1.0" encoding="utf-8"?>
+<file path=ppt/slides/slide12.xml><?xml version="1.0" encoding="utf-8"?>
 <p:sld xmlns:a="http://schemas.openxmlformats.org/drawingml/2006/main" xmlns:r="http://schemas.openxmlformats.org/officeDocument/2006/relationships" xmlns:p="http://schemas.openxmlformats.org/presentationml/2006/main">
   <p:cSld>
     <p:spTree>
@@ -5089,8 +5252,8 @@
           <a:lstStyle/>
           <a:p>
             <a:r>
-              <a:rPr lang="en-US"/>
-              <a:t>Test Results</a:t>
+              <a:rPr lang="en-US" dirty="0"/>
+              <a:t>Validation Results</a:t>
             </a:r>
           </a:p>
         </p:txBody>
@@ -5117,10 +5280,10 @@
           <a:lstStyle/>
           <a:p>
             <a:r>
-              <a:rPr lang="en-GB" b="0" i="0">
+              <a:rPr lang="en-GB" b="0" i="0" dirty="0">
                 <a:effectLst/>
               </a:rPr>
-              <a:t>Test models at epoch 100 on 500 full-sized images</a:t>
+              <a:t>Validate models at epoch 100 on 500 full-sized images</a:t>
             </a:r>
           </a:p>
         </p:txBody>
@@ -5140,13 +5303,13 @@
           <p:nvPr>
             <p:extLst>
               <p:ext uri="{D42A27DB-BD31-4B8C-83A1-F6EECF244321}">
-                <p14:modId xmlns:p14="http://schemas.microsoft.com/office/powerpoint/2010/main" val="2538361091"/>
+                <p14:modId xmlns:p14="http://schemas.microsoft.com/office/powerpoint/2010/main" val="1298849403"/>
               </p:ext>
             </p:extLst>
           </p:nvPr>
         </p:nvGraphicFramePr>
         <p:xfrm>
-          <a:off x="1524000" y="3130232"/>
+          <a:off x="1524000" y="3374390"/>
           <a:ext cx="6096000" cy="1483360"/>
         </p:xfrm>
         <a:graphic>
@@ -5199,7 +5362,7 @@
                     <a:lstStyle/>
                     <a:p>
                       <a:r>
-                        <a:rPr lang="en-US" dirty="0"/>
+                        <a:rPr lang="en-US"/>
                         <a:t>CABB</a:t>
                       </a:r>
                     </a:p>
@@ -5284,7 +5447,7 @@
                     <a:lstStyle/>
                     <a:p>
                       <a:r>
-                        <a:rPr lang="en-US"/>
+                        <a:rPr lang="en-US" dirty="0"/>
                         <a:t>46.1</a:t>
                       </a:r>
                     </a:p>
@@ -5499,13 +5662,13 @@
           <p:nvPr>
             <p:extLst>
               <p:ext uri="{D42A27DB-BD31-4B8C-83A1-F6EECF244321}">
-                <p14:modId xmlns:p14="http://schemas.microsoft.com/office/powerpoint/2010/main" val="3627895658"/>
+                <p14:modId xmlns:p14="http://schemas.microsoft.com/office/powerpoint/2010/main" val="3814069105"/>
               </p:ext>
             </p:extLst>
           </p:nvPr>
         </p:nvGraphicFramePr>
         <p:xfrm>
-          <a:off x="1524000" y="1402715"/>
+          <a:off x="1524000" y="1743393"/>
           <a:ext cx="6096000" cy="1483360"/>
         </p:xfrm>
         <a:graphic>
@@ -5558,7 +5721,7 @@
                     <a:lstStyle/>
                     <a:p>
                       <a:r>
-                        <a:rPr lang="en-US"/>
+                        <a:rPr lang="en-US" dirty="0"/>
                         <a:t>Base</a:t>
                       </a:r>
                     </a:p>
@@ -5826,7 +5989,7 @@
                     <a:lstStyle/>
                     <a:p>
                       <a:r>
-                        <a:rPr lang="en-US"/>
+                        <a:rPr lang="en-US" dirty="0"/>
                         <a:t>11</a:t>
                       </a:r>
                     </a:p>
@@ -5856,7 +6019,90 @@
 </p:sld>
 </file>
 
-<file path=ppt/slides/slide12.xml><?xml version="1.0" encoding="utf-8"?>
+<file path=ppt/slides/slide13.xml><?xml version="1.0" encoding="utf-8"?>
+<p:sld xmlns:a="http://schemas.openxmlformats.org/drawingml/2006/main" xmlns:r="http://schemas.openxmlformats.org/officeDocument/2006/relationships" xmlns:p="http://schemas.openxmlformats.org/presentationml/2006/main">
+  <p:cSld>
+    <p:spTree>
+      <p:nvGrpSpPr>
+        <p:cNvPr id="1" name=""/>
+        <p:cNvGrpSpPr/>
+        <p:nvPr/>
+      </p:nvGrpSpPr>
+      <p:grpSpPr>
+        <a:xfrm>
+          <a:off x="0" y="0"/>
+          <a:ext cx="0" cy="0"/>
+          <a:chOff x="0" y="0"/>
+          <a:chExt cx="0" cy="0"/>
+        </a:xfrm>
+      </p:grpSpPr>
+      <p:sp>
+        <p:nvSpPr>
+          <p:cNvPr id="2" name="Title 1">
+            <a:extLst>
+              <a:ext uri="{FF2B5EF4-FFF2-40B4-BE49-F238E27FC236}">
+                <a16:creationId xmlns:a16="http://schemas.microsoft.com/office/drawing/2014/main" id="{1301A668-9C9B-4CFB-B248-4E04422B723A}"/>
+              </a:ext>
+            </a:extLst>
+          </p:cNvPr>
+          <p:cNvSpPr>
+            <a:spLocks noGrp="1"/>
+          </p:cNvSpPr>
+          <p:nvPr>
+            <p:ph type="title"/>
+          </p:nvPr>
+        </p:nvSpPr>
+        <p:spPr/>
+        <p:txBody>
+          <a:bodyPr/>
+          <a:lstStyle/>
+          <a:p>
+            <a:r>
+              <a:rPr lang="en-US" dirty="0"/>
+              <a:t>Conclusion</a:t>
+            </a:r>
+          </a:p>
+        </p:txBody>
+      </p:sp>
+      <p:sp>
+        <p:nvSpPr>
+          <p:cNvPr id="3" name="Content Placeholder 2">
+            <a:extLst>
+              <a:ext uri="{FF2B5EF4-FFF2-40B4-BE49-F238E27FC236}">
+                <a16:creationId xmlns:a16="http://schemas.microsoft.com/office/drawing/2014/main" id="{4D0CC04A-0C87-4CFE-AE42-D60E694AF527}"/>
+              </a:ext>
+            </a:extLst>
+          </p:cNvPr>
+          <p:cNvSpPr>
+            <a:spLocks noGrp="1"/>
+          </p:cNvSpPr>
+          <p:nvPr>
+            <p:ph idx="1"/>
+          </p:nvPr>
+        </p:nvSpPr>
+        <p:spPr/>
+        <p:txBody>
+          <a:bodyPr/>
+          <a:lstStyle/>
+          <a:p>
+            <a:endParaRPr lang="en-US"/>
+          </a:p>
+        </p:txBody>
+      </p:sp>
+    </p:spTree>
+    <p:extLst>
+      <p:ext uri="{BB962C8B-B14F-4D97-AF65-F5344CB8AC3E}">
+        <p14:creationId xmlns:p14="http://schemas.microsoft.com/office/powerpoint/2010/main" val="3101039968"/>
+      </p:ext>
+    </p:extLst>
+  </p:cSld>
+  <p:clrMapOvr>
+    <a:masterClrMapping/>
+  </p:clrMapOvr>
+</p:sld>
+</file>
+
+<file path=ppt/slides/slide14.xml><?xml version="1.0" encoding="utf-8"?>
 <p:sld xmlns:a="http://schemas.openxmlformats.org/drawingml/2006/main" xmlns:r="http://schemas.openxmlformats.org/officeDocument/2006/relationships" xmlns:p="http://schemas.openxmlformats.org/presentationml/2006/main">
   <p:cSld>
     <p:spTree>
@@ -5895,8 +6141,8 @@
           <a:lstStyle/>
           <a:p>
             <a:r>
-              <a:rPr lang="en-US"/>
-              <a:t>Sources</a:t>
+              <a:rPr lang="en-US" dirty="0"/>
+              <a:t>References</a:t>
             </a:r>
           </a:p>
         </p:txBody>
@@ -6103,7 +6349,7 @@
 </p:sld>
 </file>
 
-<file path=ppt/slides/slide13.xml><?xml version="1.0" encoding="utf-8"?>
+<file path=ppt/slides/slide15.xml><?xml version="1.0" encoding="utf-8"?>
 <p:sld xmlns:a="http://schemas.openxmlformats.org/drawingml/2006/main" xmlns:r="http://schemas.openxmlformats.org/officeDocument/2006/relationships" xmlns:p="http://schemas.openxmlformats.org/presentationml/2006/main">
   <p:cSld>
     <p:spTree>
@@ -6370,24 +6616,24 @@
           <a:lstStyle/>
           <a:p>
             <a:r>
-              <a:rPr lang="en-US" dirty="0"/>
+              <a:rPr lang="en-US"/>
               <a:t>Region Proposal Network proposes anchor boxes</a:t>
             </a:r>
           </a:p>
           <a:p>
             <a:r>
-              <a:rPr lang="en-US" dirty="0"/>
+              <a:rPr lang="en-US"/>
               <a:t>Fully Connect Layer regresses transformations applied to the anchor to fit the ground truth Bounding Box</a:t>
             </a:r>
           </a:p>
           <a:p>
             <a:r>
-              <a:rPr lang="en-US" dirty="0"/>
+              <a:rPr lang="en-US"/>
               <a:t>Smooth-L1 Loss</a:t>
             </a:r>
           </a:p>
           <a:p>
-            <a:endParaRPr lang="en-US" dirty="0"/>
+            <a:endParaRPr lang="en-US"/>
           </a:p>
         </p:txBody>
       </p:sp>
@@ -6794,7 +7040,7 @@
               <a:buNone/>
             </a:pPr>
             <a:r>
-              <a:rPr lang="en-GB" kern="0" dirty="0">
+              <a:rPr lang="en-GB" kern="0">
                 <a:solidFill>
                   <a:srgbClr val="002060"/>
                 </a:solidFill>
@@ -6802,18 +7048,18 @@
               <a:t>Ground Truth</a:t>
             </a:r>
             <a:r>
-              <a:rPr lang="en-GB" kern="0" dirty="0"/>
+              <a:rPr lang="en-GB" kern="0"/>
               <a:t>, </a:t>
             </a:r>
             <a:r>
-              <a:rPr lang="en-GB" kern="0" dirty="0">
+              <a:rPr lang="en-GB" kern="0">
                 <a:solidFill>
                   <a:srgbClr val="FF0000"/>
                 </a:solidFill>
               </a:rPr>
               <a:t>Anchor Box</a:t>
             </a:r>
-            <a:endParaRPr lang="en-GB" kern="0" dirty="0">
+            <a:endParaRPr lang="en-GB" kern="0">
               <a:solidFill>
                 <a:srgbClr val="E8DD00"/>
               </a:solidFill>
@@ -7150,24 +7396,24 @@
           <a:lstStyle/>
           <a:p>
             <a:r>
-              <a:rPr lang="en-US" dirty="0"/>
+              <a:rPr lang="en-US"/>
               <a:t>Network is allowed to “hallucinate”</a:t>
             </a:r>
           </a:p>
           <a:p>
             <a:r>
-              <a:rPr lang="en-US" dirty="0"/>
+              <a:rPr lang="en-US"/>
               <a:t>Can improve performance on objects which were cropped in training</a:t>
             </a:r>
           </a:p>
           <a:p>
-            <a:endParaRPr lang="en-US" dirty="0"/>
+            <a:endParaRPr lang="en-US"/>
           </a:p>
           <a:p>
             <a:pPr marL="0" indent="0">
               <a:buNone/>
             </a:pPr>
-            <a:endParaRPr lang="en-US" dirty="0"/>
+            <a:endParaRPr lang="en-US"/>
           </a:p>
         </p:txBody>
       </p:sp>
@@ -7347,7 +7593,7 @@
               <a:buNone/>
             </a:pPr>
             <a:r>
-              <a:rPr lang="en-GB" dirty="0">
+              <a:rPr lang="en-GB">
                 <a:solidFill>
                   <a:srgbClr val="002060"/>
                 </a:solidFill>
@@ -7355,11 +7601,11 @@
               <a:t>Ground Truth</a:t>
             </a:r>
             <a:r>
-              <a:rPr lang="en-GB" dirty="0"/>
+              <a:rPr lang="en-GB"/>
               <a:t>, </a:t>
             </a:r>
             <a:r>
-              <a:rPr lang="en-GB" dirty="0">
+              <a:rPr lang="en-GB">
                 <a:solidFill>
                   <a:srgbClr val="00B050"/>
                 </a:solidFill>
@@ -7367,11 +7613,11 @@
               <a:t>Prediction</a:t>
             </a:r>
             <a:r>
-              <a:rPr lang="en-GB" dirty="0"/>
+              <a:rPr lang="en-GB"/>
               <a:t>, </a:t>
             </a:r>
             <a:r>
-              <a:rPr lang="en-GB" dirty="0">
+              <a:rPr lang="en-GB">
                 <a:solidFill>
                   <a:schemeClr val="tx2">
                     <a:lumMod val="40000"/>
@@ -7382,11 +7628,11 @@
               <a:t>Crop Area</a:t>
             </a:r>
             <a:r>
-              <a:rPr lang="en-GB" dirty="0"/>
+              <a:rPr lang="en-GB"/>
               <a:t>, </a:t>
             </a:r>
             <a:r>
-              <a:rPr lang="en-GB" dirty="0">
+              <a:rPr lang="en-GB">
                 <a:solidFill>
                   <a:srgbClr val="FF0000"/>
                 </a:solidFill>
@@ -7394,11 +7640,11 @@
               <a:t>Anchor Box</a:t>
             </a:r>
             <a:r>
-              <a:rPr lang="en-GB" dirty="0"/>
+              <a:rPr lang="en-GB"/>
               <a:t>, </a:t>
             </a:r>
             <a:r>
-              <a:rPr lang="en-GB" dirty="0">
+              <a:rPr lang="en-GB">
                 <a:solidFill>
                   <a:srgbClr val="E8DD00"/>
                 </a:solidFill>
@@ -7578,10 +7824,10 @@
       </p:grpSpPr>
       <p:sp>
         <p:nvSpPr>
-          <p:cNvPr id="2" name="Titel 1">
+          <p:cNvPr id="2" name="Title 1">
             <a:extLst>
               <a:ext uri="{FF2B5EF4-FFF2-40B4-BE49-F238E27FC236}">
-                <a16:creationId xmlns:a16="http://schemas.microsoft.com/office/drawing/2014/main" id="{2DE899C9-ECB8-4209-B44A-D55809197041}"/>
+                <a16:creationId xmlns:a16="http://schemas.microsoft.com/office/drawing/2014/main" id="{CDD681D0-9648-4448-8027-24F11F18DF8C}"/>
               </a:ext>
             </a:extLst>
           </p:cNvPr>
@@ -7598,18 +7844,18 @@
           <a:lstStyle/>
           <a:p>
             <a:r>
-              <a:rPr lang="en-US"/>
-              <a:t>Training Setting</a:t>
+              <a:rPr lang="en-US" dirty="0"/>
+              <a:t>Dataset</a:t>
             </a:r>
           </a:p>
         </p:txBody>
       </p:sp>
       <p:sp>
         <p:nvSpPr>
-          <p:cNvPr id="3" name="Inhaltsplatzhalter 2">
+          <p:cNvPr id="3" name="Content Placeholder 2">
             <a:extLst>
               <a:ext uri="{FF2B5EF4-FFF2-40B4-BE49-F238E27FC236}">
-                <a16:creationId xmlns:a16="http://schemas.microsoft.com/office/drawing/2014/main" id="{855BEFD4-C452-40AA-8020-77316D8CF61E}"/>
+                <a16:creationId xmlns:a16="http://schemas.microsoft.com/office/drawing/2014/main" id="{32B4301B-1D8A-4760-8D63-E70381AAD5D9}"/>
               </a:ext>
             </a:extLst>
           </p:cNvPr>
@@ -7626,33 +7872,40 @@
           <a:lstStyle/>
           <a:p>
             <a:r>
-              <a:rPr lang="en-US"/>
-              <a:t>1024*512 Image size, 512*256 Crop size</a:t>
-            </a:r>
-          </a:p>
-          <a:p>
-            <a:r>
-              <a:rPr lang="en-US"/>
-              <a:t>8 Image per Batch on a single GPU</a:t>
-            </a:r>
-          </a:p>
-          <a:p>
-            <a:r>
-              <a:rPr lang="en-US"/>
-              <a:t>100 epochs of training with </a:t>
-            </a:r>
-            <a:r>
-              <a:rPr lang="en-US" b="0" i="0" u="none" strike="noStrike" baseline="0"/>
-              <a:t>2975 training images</a:t>
-            </a:r>
-            <a:endParaRPr lang="en-US"/>
+              <a:rPr lang="en-US" dirty="0"/>
+              <a:t>Cityscapes Dataset</a:t>
+            </a:r>
+          </a:p>
+          <a:p>
+            <a:pPr lvl="1"/>
+            <a:r>
+              <a:rPr lang="en-US" dirty="0"/>
+              <a:t>2975 training samples</a:t>
+            </a:r>
+          </a:p>
+          <a:p>
+            <a:pPr lvl="1"/>
+            <a:r>
+              <a:rPr lang="en-US" dirty="0"/>
+              <a:t>500 validation samples</a:t>
+            </a:r>
+          </a:p>
+          <a:p>
+            <a:pPr lvl="1"/>
+            <a:r>
+              <a:rPr lang="en-US" dirty="0"/>
+              <a:t>1525 test samples without ground truth</a:t>
+            </a:r>
+          </a:p>
+          <a:p>
+            <a:endParaRPr lang="en-US" dirty="0"/>
           </a:p>
         </p:txBody>
       </p:sp>
     </p:spTree>
     <p:extLst>
       <p:ext uri="{BB962C8B-B14F-4D97-AF65-F5344CB8AC3E}">
-        <p14:creationId xmlns:p14="http://schemas.microsoft.com/office/powerpoint/2010/main" val="2836184599"/>
+        <p14:creationId xmlns:p14="http://schemas.microsoft.com/office/powerpoint/2010/main" val="1654048308"/>
       </p:ext>
     </p:extLst>
   </p:cSld>

</xml_diff>